<commit_message>
update to chapter 42
</commit_message>
<xml_diff>
--- a/MySQL实战/39自增主键为什么不是连续的？.pptx
+++ b/MySQL实战/39自增主键为什么不是连续的？.pptx
@@ -5,13 +5,14 @@
     <p:sldMasterId id="2147483678" r:id="rId1"/>
   </p:sldMasterIdLst>
   <p:notesMasterIdLst>
-    <p:notesMasterId r:id="rId6"/>
+    <p:notesMasterId r:id="rId7"/>
   </p:notesMasterIdLst>
   <p:sldIdLst>
     <p:sldId id="256" r:id="rId2"/>
     <p:sldId id="265" r:id="rId3"/>
     <p:sldId id="269" r:id="rId4"/>
     <p:sldId id="268" r:id="rId5"/>
+    <p:sldId id="270" r:id="rId6"/>
   </p:sldIdLst>
   <p:sldSz cx="12192000" cy="6858000"/>
   <p:notesSz cx="6858000" cy="9144000"/>
@@ -200,7 +201,7 @@
           <a:p>
             <a:fld id="{A900F2CD-AD8F-46FC-AAAB-A0D218D6826F}" type="datetimeFigureOut">
               <a:rPr lang="zh-CN" altLang="en-US" smtClean="0"/>
-              <a:t>2019/6/12</a:t>
+              <a:t>2019/6/25</a:t>
             </a:fld>
             <a:endParaRPr lang="zh-CN" altLang="en-US"/>
           </a:p>
@@ -720,6 +721,90 @@
 </p:notes>
 </file>
 
+<file path=ppt/notesSlides/notesSlide4.xml><?xml version="1.0" encoding="utf-8"?>
+<p:notes xmlns:a="http://schemas.openxmlformats.org/drawingml/2006/main" xmlns:r="http://schemas.openxmlformats.org/officeDocument/2006/relationships" xmlns:p="http://schemas.openxmlformats.org/presentationml/2006/main">
+  <p:cSld>
+    <p:spTree>
+      <p:nvGrpSpPr>
+        <p:cNvPr id="1" name=""/>
+        <p:cNvGrpSpPr/>
+        <p:nvPr/>
+      </p:nvGrpSpPr>
+      <p:grpSpPr>
+        <a:xfrm>
+          <a:off x="0" y="0"/>
+          <a:ext cx="0" cy="0"/>
+          <a:chOff x="0" y="0"/>
+          <a:chExt cx="0" cy="0"/>
+        </a:xfrm>
+      </p:grpSpPr>
+      <p:sp>
+        <p:nvSpPr>
+          <p:cNvPr id="2" name="幻灯片图像占位符 1"/>
+          <p:cNvSpPr>
+            <a:spLocks noGrp="1" noRot="1" noChangeAspect="1"/>
+          </p:cNvSpPr>
+          <p:nvPr>
+            <p:ph type="sldImg"/>
+          </p:nvPr>
+        </p:nvSpPr>
+        <p:spPr/>
+      </p:sp>
+      <p:sp>
+        <p:nvSpPr>
+          <p:cNvPr id="3" name="备注占位符 2"/>
+          <p:cNvSpPr>
+            <a:spLocks noGrp="1"/>
+          </p:cNvSpPr>
+          <p:nvPr>
+            <p:ph type="body" idx="1"/>
+          </p:nvPr>
+        </p:nvSpPr>
+        <p:spPr/>
+        <p:txBody>
+          <a:bodyPr/>
+          <a:lstStyle/>
+          <a:p>
+            <a:endParaRPr lang="zh-CN" altLang="en-US" dirty="0"/>
+          </a:p>
+        </p:txBody>
+      </p:sp>
+      <p:sp>
+        <p:nvSpPr>
+          <p:cNvPr id="4" name="灯片编号占位符 3"/>
+          <p:cNvSpPr>
+            <a:spLocks noGrp="1"/>
+          </p:cNvSpPr>
+          <p:nvPr>
+            <p:ph type="sldNum" sz="quarter" idx="10"/>
+          </p:nvPr>
+        </p:nvSpPr>
+        <p:spPr/>
+        <p:txBody>
+          <a:bodyPr/>
+          <a:lstStyle/>
+          <a:p>
+            <a:fld id="{36BCCB51-EBEF-4070-8A6F-AD7BCDF80C49}" type="slidenum">
+              <a:rPr lang="zh-CN" altLang="en-US" smtClean="0"/>
+              <a:t>5</a:t>
+            </a:fld>
+            <a:endParaRPr lang="zh-CN" altLang="en-US"/>
+          </a:p>
+        </p:txBody>
+      </p:sp>
+    </p:spTree>
+    <p:extLst>
+      <p:ext uri="{BB962C8B-B14F-4D97-AF65-F5344CB8AC3E}">
+        <p14:creationId xmlns:p14="http://schemas.microsoft.com/office/powerpoint/2010/main" val="670642807"/>
+      </p:ext>
+    </p:extLst>
+  </p:cSld>
+  <p:clrMapOvr>
+    <a:masterClrMapping/>
+  </p:clrMapOvr>
+</p:notes>
+</file>
+
 <file path=ppt/slideLayouts/slideLayout1.xml><?xml version="1.0" encoding="utf-8"?>
 <p:sldLayout xmlns:a="http://schemas.openxmlformats.org/drawingml/2006/main" xmlns:r="http://schemas.openxmlformats.org/officeDocument/2006/relationships" xmlns:p="http://schemas.openxmlformats.org/presentationml/2006/main" type="title" preserve="1">
   <p:cSld name="标题幻灯片">
@@ -906,7 +991,7 @@
           <a:p>
             <a:fld id="{E396512D-F96B-4538-B91A-F7EB57A489A0}" type="datetimeFigureOut">
               <a:rPr lang="zh-CN" altLang="en-US" smtClean="0"/>
-              <a:t>2019/6/12</a:t>
+              <a:t>2019/6/25</a:t>
             </a:fld>
             <a:endParaRPr lang="zh-CN" altLang="en-US"/>
           </a:p>
@@ -1181,7 +1266,7 @@
           <a:p>
             <a:fld id="{E396512D-F96B-4538-B91A-F7EB57A489A0}" type="datetimeFigureOut">
               <a:rPr lang="zh-CN" altLang="en-US" smtClean="0"/>
-              <a:t>2019/6/12</a:t>
+              <a:t>2019/6/25</a:t>
             </a:fld>
             <a:endParaRPr lang="zh-CN" altLang="en-US"/>
           </a:p>
@@ -1375,7 +1460,7 @@
           <a:p>
             <a:fld id="{E396512D-F96B-4538-B91A-F7EB57A489A0}" type="datetimeFigureOut">
               <a:rPr lang="zh-CN" altLang="en-US" smtClean="0"/>
-              <a:t>2019/6/12</a:t>
+              <a:t>2019/6/25</a:t>
             </a:fld>
             <a:endParaRPr lang="zh-CN" altLang="en-US"/>
           </a:p>
@@ -1648,7 +1733,7 @@
           <a:p>
             <a:fld id="{E396512D-F96B-4538-B91A-F7EB57A489A0}" type="datetimeFigureOut">
               <a:rPr lang="zh-CN" altLang="en-US" smtClean="0"/>
-              <a:t>2019/6/12</a:t>
+              <a:t>2019/6/25</a:t>
             </a:fld>
             <a:endParaRPr lang="zh-CN" altLang="en-US"/>
           </a:p>
@@ -1989,7 +2074,7 @@
           <a:p>
             <a:fld id="{E396512D-F96B-4538-B91A-F7EB57A489A0}" type="datetimeFigureOut">
               <a:rPr lang="zh-CN" altLang="en-US" smtClean="0"/>
-              <a:t>2019/6/12</a:t>
+              <a:t>2019/6/25</a:t>
             </a:fld>
             <a:endParaRPr lang="zh-CN" altLang="en-US"/>
           </a:p>
@@ -2612,7 +2697,7 @@
           <a:p>
             <a:fld id="{E396512D-F96B-4538-B91A-F7EB57A489A0}" type="datetimeFigureOut">
               <a:rPr lang="zh-CN" altLang="en-US" smtClean="0"/>
-              <a:t>2019/6/12</a:t>
+              <a:t>2019/6/25</a:t>
             </a:fld>
             <a:endParaRPr lang="zh-CN" altLang="en-US"/>
           </a:p>
@@ -3472,7 +3557,7 @@
           <a:p>
             <a:fld id="{E396512D-F96B-4538-B91A-F7EB57A489A0}" type="datetimeFigureOut">
               <a:rPr lang="zh-CN" altLang="en-US" smtClean="0"/>
-              <a:t>2019/6/12</a:t>
+              <a:t>2019/6/25</a:t>
             </a:fld>
             <a:endParaRPr lang="zh-CN" altLang="en-US"/>
           </a:p>
@@ -3642,7 +3727,7 @@
           <a:p>
             <a:fld id="{E396512D-F96B-4538-B91A-F7EB57A489A0}" type="datetimeFigureOut">
               <a:rPr lang="zh-CN" altLang="en-US" smtClean="0"/>
-              <a:t>2019/6/12</a:t>
+              <a:t>2019/6/25</a:t>
             </a:fld>
             <a:endParaRPr lang="zh-CN" altLang="en-US"/>
           </a:p>
@@ -3822,7 +3907,7 @@
           <a:p>
             <a:fld id="{E396512D-F96B-4538-B91A-F7EB57A489A0}" type="datetimeFigureOut">
               <a:rPr lang="zh-CN" altLang="en-US" smtClean="0"/>
-              <a:t>2019/6/12</a:t>
+              <a:t>2019/6/25</a:t>
             </a:fld>
             <a:endParaRPr lang="zh-CN" altLang="en-US"/>
           </a:p>
@@ -3992,7 +4077,7 @@
           <a:p>
             <a:fld id="{E396512D-F96B-4538-B91A-F7EB57A489A0}" type="datetimeFigureOut">
               <a:rPr lang="zh-CN" altLang="en-US" smtClean="0"/>
-              <a:t>2019/6/12</a:t>
+              <a:t>2019/6/25</a:t>
             </a:fld>
             <a:endParaRPr lang="zh-CN" altLang="en-US"/>
           </a:p>
@@ -4239,7 +4324,7 @@
           <a:p>
             <a:fld id="{E396512D-F96B-4538-B91A-F7EB57A489A0}" type="datetimeFigureOut">
               <a:rPr lang="zh-CN" altLang="en-US" smtClean="0"/>
-              <a:t>2019/6/12</a:t>
+              <a:t>2019/6/25</a:t>
             </a:fld>
             <a:endParaRPr lang="zh-CN" altLang="en-US"/>
           </a:p>
@@ -4531,7 +4616,7 @@
           <a:p>
             <a:fld id="{E396512D-F96B-4538-B91A-F7EB57A489A0}" type="datetimeFigureOut">
               <a:rPr lang="zh-CN" altLang="en-US" smtClean="0"/>
-              <a:t>2019/6/12</a:t>
+              <a:t>2019/6/25</a:t>
             </a:fld>
             <a:endParaRPr lang="zh-CN" altLang="en-US"/>
           </a:p>
@@ -4975,7 +5060,7 @@
           <a:p>
             <a:fld id="{E396512D-F96B-4538-B91A-F7EB57A489A0}" type="datetimeFigureOut">
               <a:rPr lang="zh-CN" altLang="en-US" smtClean="0"/>
-              <a:t>2019/6/12</a:t>
+              <a:t>2019/6/25</a:t>
             </a:fld>
             <a:endParaRPr lang="zh-CN" altLang="en-US"/>
           </a:p>
@@ -5093,7 +5178,7 @@
           <a:p>
             <a:fld id="{E396512D-F96B-4538-B91A-F7EB57A489A0}" type="datetimeFigureOut">
               <a:rPr lang="zh-CN" altLang="en-US" smtClean="0"/>
-              <a:t>2019/6/12</a:t>
+              <a:t>2019/6/25</a:t>
             </a:fld>
             <a:endParaRPr lang="zh-CN" altLang="en-US"/>
           </a:p>
@@ -5188,7 +5273,7 @@
           <a:p>
             <a:fld id="{E396512D-F96B-4538-B91A-F7EB57A489A0}" type="datetimeFigureOut">
               <a:rPr lang="zh-CN" altLang="en-US" smtClean="0"/>
-              <a:t>2019/6/12</a:t>
+              <a:t>2019/6/25</a:t>
             </a:fld>
             <a:endParaRPr lang="zh-CN" altLang="en-US"/>
           </a:p>
@@ -5467,7 +5552,7 @@
           <a:p>
             <a:fld id="{E396512D-F96B-4538-B91A-F7EB57A489A0}" type="datetimeFigureOut">
               <a:rPr lang="zh-CN" altLang="en-US" smtClean="0"/>
-              <a:t>2019/6/12</a:t>
+              <a:t>2019/6/25</a:t>
             </a:fld>
             <a:endParaRPr lang="zh-CN" altLang="en-US"/>
           </a:p>
@@ -5742,7 +5827,7 @@
           <a:p>
             <a:fld id="{E396512D-F96B-4538-B91A-F7EB57A489A0}" type="datetimeFigureOut">
               <a:rPr lang="zh-CN" altLang="en-US" smtClean="0"/>
-              <a:t>2019/6/12</a:t>
+              <a:t>2019/6/25</a:t>
             </a:fld>
             <a:endParaRPr lang="zh-CN" altLang="en-US"/>
           </a:p>
@@ -6171,7 +6256,7 @@
           <a:p>
             <a:fld id="{E396512D-F96B-4538-B91A-F7EB57A489A0}" type="datetimeFigureOut">
               <a:rPr lang="zh-CN" altLang="en-US" smtClean="0"/>
-              <a:t>2019/6/12</a:t>
+              <a:t>2019/6/25</a:t>
             </a:fld>
             <a:endParaRPr lang="zh-CN" altLang="en-US"/>
           </a:p>
@@ -8279,14 +8364,7 @@
                 <a:latin typeface="微软雅黑" panose="020B0503020204020204" pitchFamily="34" charset="-122"/>
                 <a:ea typeface="微软雅黑" panose="020B0503020204020204" pitchFamily="34" charset="-122"/>
               </a:rPr>
-              <a:t>insert </a:t>
-            </a:r>
-            <a:r>
-              <a:rPr lang="en-US" altLang="zh-CN" sz="1400" dirty="0" smtClean="0">
-                <a:latin typeface="微软雅黑" panose="020B0503020204020204" pitchFamily="34" charset="-122"/>
-                <a:ea typeface="微软雅黑" panose="020B0503020204020204" pitchFamily="34" charset="-122"/>
-              </a:rPr>
-              <a:t>id</a:t>
+              <a:t>insert id</a:t>
             </a:r>
             <a:r>
               <a:rPr lang="zh-CN" altLang="en-US" sz="1400" dirty="0" smtClean="0">
@@ -9645,14 +9723,7 @@
                 <a:latin typeface="微软雅黑" panose="020B0503020204020204" pitchFamily="34" charset="-122"/>
                 <a:ea typeface="微软雅黑" panose="020B0503020204020204" pitchFamily="34" charset="-122"/>
               </a:rPr>
-              <a:t>浪费</a:t>
-            </a:r>
-            <a:r>
-              <a:rPr lang="zh-CN" altLang="en-US" sz="1200" dirty="0" smtClean="0">
-                <a:latin typeface="微软雅黑" panose="020B0503020204020204" pitchFamily="34" charset="-122"/>
-                <a:ea typeface="微软雅黑" panose="020B0503020204020204" pitchFamily="34" charset="-122"/>
-              </a:rPr>
-              <a:t>了，造成了自</a:t>
+              <a:t>浪费了，造成了自</a:t>
             </a:r>
             <a:r>
               <a:rPr lang="zh-CN" altLang="en-US" sz="1200" smtClean="0">
@@ -11092,14 +11163,7 @@
                 <a:latin typeface="微软雅黑" panose="020B0503020204020204" pitchFamily="34" charset="-122"/>
                 <a:ea typeface="微软雅黑" panose="020B0503020204020204" pitchFamily="34" charset="-122"/>
               </a:rPr>
-              <a:t>最后一次总有用不完的，但也浪费了</a:t>
-            </a:r>
-            <a:r>
-              <a:rPr lang="zh-CN" altLang="en-US" sz="1200" dirty="0" smtClean="0">
-                <a:latin typeface="微软雅黑" panose="020B0503020204020204" pitchFamily="34" charset="-122"/>
-                <a:ea typeface="微软雅黑" panose="020B0503020204020204" pitchFamily="34" charset="-122"/>
-              </a:rPr>
-              <a:t>。</a:t>
+              <a:t>最后一次总有用不完的，但也浪费了。</a:t>
             </a:r>
             <a:endParaRPr lang="en-US" altLang="zh-CN" sz="1200" dirty="0" smtClean="0">
               <a:latin typeface="微软雅黑" panose="020B0503020204020204" pitchFamily="34" charset="-122"/>
@@ -11145,6 +11209,2025 @@
     <p:extLst>
       <p:ext uri="{BB962C8B-B14F-4D97-AF65-F5344CB8AC3E}">
         <p14:creationId xmlns:p14="http://schemas.microsoft.com/office/powerpoint/2010/main" val="1013956753"/>
+      </p:ext>
+    </p:extLst>
+  </p:cSld>
+  <p:clrMapOvr>
+    <a:masterClrMapping/>
+  </p:clrMapOvr>
+  <p:timing>
+    <p:tnLst>
+      <p:par>
+        <p:cTn id="1" dur="indefinite" restart="never" nodeType="tmRoot"/>
+      </p:par>
+    </p:tnLst>
+  </p:timing>
+</p:sld>
+</file>
+
+<file path=ppt/slides/slide5.xml><?xml version="1.0" encoding="utf-8"?>
+<p:sld xmlns:a="http://schemas.openxmlformats.org/drawingml/2006/main" xmlns:r="http://schemas.openxmlformats.org/officeDocument/2006/relationships" xmlns:p="http://schemas.openxmlformats.org/presentationml/2006/main">
+  <p:cSld>
+    <p:spTree>
+      <p:nvGrpSpPr>
+        <p:cNvPr id="1" name=""/>
+        <p:cNvGrpSpPr/>
+        <p:nvPr/>
+      </p:nvGrpSpPr>
+      <p:grpSpPr>
+        <a:xfrm>
+          <a:off x="0" y="0"/>
+          <a:ext cx="0" cy="0"/>
+          <a:chOff x="0" y="0"/>
+          <a:chExt cx="0" cy="0"/>
+        </a:xfrm>
+      </p:grpSpPr>
+      <p:sp>
+        <p:nvSpPr>
+          <p:cNvPr id="2" name="标题 1"/>
+          <p:cNvSpPr>
+            <a:spLocks noGrp="1"/>
+          </p:cNvSpPr>
+          <p:nvPr>
+            <p:ph type="title"/>
+          </p:nvPr>
+        </p:nvSpPr>
+        <p:spPr>
+          <a:xfrm>
+            <a:off x="114300" y="152400"/>
+            <a:ext cx="11149057" cy="602359"/>
+          </a:xfrm>
+        </p:spPr>
+        <p:txBody>
+          <a:bodyPr/>
+          <a:lstStyle/>
+          <a:p>
+            <a:r>
+              <a:rPr lang="en-US" altLang="zh-CN" sz="3200" b="1" dirty="0">
+                <a:latin typeface="微软雅黑" panose="020B0503020204020204" pitchFamily="34" charset="-122"/>
+                <a:ea typeface="微软雅黑" panose="020B0503020204020204" pitchFamily="34" charset="-122"/>
+              </a:rPr>
+              <a:t>39 | </a:t>
+            </a:r>
+            <a:r>
+              <a:rPr lang="zh-CN" altLang="en-US" sz="3200" b="1" dirty="0">
+                <a:latin typeface="微软雅黑" panose="020B0503020204020204" pitchFamily="34" charset="-122"/>
+                <a:ea typeface="微软雅黑" panose="020B0503020204020204" pitchFamily="34" charset="-122"/>
+              </a:rPr>
+              <a:t>自增主键为什么不是连续的？</a:t>
+            </a:r>
+          </a:p>
+        </p:txBody>
+      </p:sp>
+      <p:sp>
+        <p:nvSpPr>
+          <p:cNvPr id="7" name="文本框 6"/>
+          <p:cNvSpPr txBox="1"/>
+          <p:nvPr/>
+        </p:nvSpPr>
+        <p:spPr>
+          <a:xfrm>
+            <a:off x="114300" y="842111"/>
+            <a:ext cx="1569660" cy="369332"/>
+          </a:xfrm>
+          <a:prstGeom prst="rect">
+            <a:avLst/>
+          </a:prstGeom>
+          <a:noFill/>
+        </p:spPr>
+        <p:txBody>
+          <a:bodyPr wrap="none">
+            <a:spAutoFit/>
+            <a:scene3d>
+              <a:camera prst="orthographicFront"/>
+              <a:lightRig rig="harsh" dir="t"/>
+            </a:scene3d>
+            <a:sp3d extrusionH="57150" prstMaterial="matte">
+              <a:bevelT w="63500" h="12700" prst="angle"/>
+              <a:contourClr>
+                <a:schemeClr val="bg1">
+                  <a:lumMod val="65000"/>
+                </a:schemeClr>
+              </a:contourClr>
+            </a:sp3d>
+          </a:bodyPr>
+          <a:lstStyle/>
+          <a:p>
+            <a:pPr>
+              <a:defRPr/>
+            </a:pPr>
+            <a:r>
+              <a:rPr lang="zh-CN" altLang="en-US" b="1" dirty="0" smtClean="0">
+                <a:ln/>
+                <a:solidFill>
+                  <a:srgbClr val="4FD1FF"/>
+                </a:solidFill>
+                <a:latin typeface="微软雅黑" panose="020B0503020204020204" pitchFamily="34" charset="-122"/>
+                <a:ea typeface="微软雅黑" panose="020B0503020204020204" pitchFamily="34" charset="-122"/>
+              </a:rPr>
+              <a:t>自增锁的优化</a:t>
+            </a:r>
+            <a:endParaRPr lang="en-US" altLang="zh-CN" b="1" dirty="0">
+              <a:ln/>
+              <a:solidFill>
+                <a:srgbClr val="4FD1FF"/>
+              </a:solidFill>
+              <a:latin typeface="微软雅黑" panose="020B0503020204020204" pitchFamily="34" charset="-122"/>
+              <a:ea typeface="微软雅黑" panose="020B0503020204020204" pitchFamily="34" charset="-122"/>
+            </a:endParaRPr>
+          </a:p>
+        </p:txBody>
+      </p:sp>
+      <p:sp>
+        <p:nvSpPr>
+          <p:cNvPr id="11" name="矩形 10"/>
+          <p:cNvSpPr/>
+          <p:nvPr/>
+        </p:nvSpPr>
+        <p:spPr>
+          <a:xfrm>
+            <a:off x="114300" y="1211443"/>
+            <a:ext cx="9553575" cy="1384995"/>
+          </a:xfrm>
+          <a:prstGeom prst="rect">
+            <a:avLst/>
+          </a:prstGeom>
+        </p:spPr>
+        <p:txBody>
+          <a:bodyPr wrap="square">
+            <a:spAutoFit/>
+          </a:bodyPr>
+          <a:lstStyle/>
+          <a:p>
+            <a:r>
+              <a:rPr lang="en-US" altLang="zh-CN" sz="1400" dirty="0" smtClean="0">
+                <a:solidFill>
+                  <a:srgbClr val="92D050"/>
+                </a:solidFill>
+                <a:latin typeface="微软雅黑" panose="020B0503020204020204" pitchFamily="34" charset="-122"/>
+                <a:ea typeface="微软雅黑" panose="020B0503020204020204" pitchFamily="34" charset="-122"/>
+              </a:rPr>
+              <a:t>MySQL 5.1.22</a:t>
+            </a:r>
+            <a:r>
+              <a:rPr lang="zh-CN" altLang="en-US" sz="1400" dirty="0">
+                <a:solidFill>
+                  <a:srgbClr val="92D050"/>
+                </a:solidFill>
+                <a:latin typeface="微软雅黑" panose="020B0503020204020204" pitchFamily="34" charset="-122"/>
+                <a:ea typeface="微软雅黑" panose="020B0503020204020204" pitchFamily="34" charset="-122"/>
+              </a:rPr>
+              <a:t>引入的</a:t>
+            </a:r>
+            <a:r>
+              <a:rPr lang="zh-CN" altLang="en-US" sz="1400" dirty="0" smtClean="0">
+                <a:solidFill>
+                  <a:srgbClr val="92D050"/>
+                </a:solidFill>
+                <a:latin typeface="微软雅黑" panose="020B0503020204020204" pitchFamily="34" charset="-122"/>
+                <a:ea typeface="微软雅黑" panose="020B0503020204020204" pitchFamily="34" charset="-122"/>
+              </a:rPr>
+              <a:t>策略：</a:t>
+            </a:r>
+            <a:endParaRPr lang="en-US" altLang="zh-CN" sz="1400" dirty="0" smtClean="0">
+              <a:solidFill>
+                <a:srgbClr val="92D050"/>
+              </a:solidFill>
+              <a:latin typeface="微软雅黑" panose="020B0503020204020204" pitchFamily="34" charset="-122"/>
+              <a:ea typeface="微软雅黑" panose="020B0503020204020204" pitchFamily="34" charset="-122"/>
+            </a:endParaRPr>
+          </a:p>
+          <a:p>
+            <a:r>
+              <a:rPr lang="zh-CN" altLang="en-US" sz="1400" dirty="0" smtClean="0">
+                <a:solidFill>
+                  <a:srgbClr val="92D050"/>
+                </a:solidFill>
+                <a:latin typeface="微软雅黑" panose="020B0503020204020204" pitchFamily="34" charset="-122"/>
+                <a:ea typeface="微软雅黑" panose="020B0503020204020204" pitchFamily="34" charset="-122"/>
+              </a:rPr>
+              <a:t>参数 </a:t>
+            </a:r>
+            <a:r>
+              <a:rPr lang="en-US" altLang="zh-CN" sz="1400" dirty="0" err="1" smtClean="0">
+                <a:solidFill>
+                  <a:srgbClr val="92D050"/>
+                </a:solidFill>
+                <a:latin typeface="微软雅黑" panose="020B0503020204020204" pitchFamily="34" charset="-122"/>
+                <a:ea typeface="微软雅黑" panose="020B0503020204020204" pitchFamily="34" charset="-122"/>
+              </a:rPr>
+              <a:t>innodb_autoinc_lock_mode</a:t>
+            </a:r>
+            <a:r>
+              <a:rPr lang="zh-CN" altLang="en-US" sz="1400" dirty="0" smtClean="0">
+                <a:solidFill>
+                  <a:srgbClr val="92D050"/>
+                </a:solidFill>
+                <a:latin typeface="微软雅黑" panose="020B0503020204020204" pitchFamily="34" charset="-122"/>
+                <a:ea typeface="微软雅黑" panose="020B0503020204020204" pitchFamily="34" charset="-122"/>
+              </a:rPr>
+              <a:t>：</a:t>
+            </a:r>
+            <a:endParaRPr lang="en-US" altLang="zh-CN" sz="1400" dirty="0" smtClean="0">
+              <a:solidFill>
+                <a:srgbClr val="92D050"/>
+              </a:solidFill>
+              <a:latin typeface="微软雅黑" panose="020B0503020204020204" pitchFamily="34" charset="-122"/>
+              <a:ea typeface="微软雅黑" panose="020B0503020204020204" pitchFamily="34" charset="-122"/>
+            </a:endParaRPr>
+          </a:p>
+          <a:p>
+            <a:r>
+              <a:rPr lang="en-US" altLang="zh-CN" sz="1400" dirty="0" smtClean="0">
+                <a:solidFill>
+                  <a:srgbClr val="92D050"/>
+                </a:solidFill>
+                <a:latin typeface="微软雅黑" panose="020B0503020204020204" pitchFamily="34" charset="-122"/>
+                <a:ea typeface="微软雅黑" panose="020B0503020204020204" pitchFamily="34" charset="-122"/>
+              </a:rPr>
+              <a:t>【=0】</a:t>
+            </a:r>
+            <a:r>
+              <a:rPr lang="zh-CN" altLang="en-US" sz="1400" dirty="0">
+                <a:solidFill>
+                  <a:srgbClr val="92D050"/>
+                </a:solidFill>
+                <a:latin typeface="微软雅黑" panose="020B0503020204020204" pitchFamily="34" charset="-122"/>
+                <a:ea typeface="微软雅黑" panose="020B0503020204020204" pitchFamily="34" charset="-122"/>
+              </a:rPr>
+              <a:t>语句</a:t>
+            </a:r>
+            <a:r>
+              <a:rPr lang="zh-CN" altLang="en-US" sz="1400" dirty="0" smtClean="0">
+                <a:solidFill>
+                  <a:srgbClr val="92D050"/>
+                </a:solidFill>
+                <a:latin typeface="微软雅黑" panose="020B0503020204020204" pitchFamily="34" charset="-122"/>
+                <a:ea typeface="微软雅黑" panose="020B0503020204020204" pitchFamily="34" charset="-122"/>
+              </a:rPr>
+              <a:t>执行前申请自增锁，语句执行结束释放自增锁。</a:t>
+            </a:r>
+            <a:endParaRPr lang="en-US" altLang="zh-CN" sz="1400" dirty="0" smtClean="0">
+              <a:solidFill>
+                <a:srgbClr val="92D050"/>
+              </a:solidFill>
+              <a:latin typeface="微软雅黑" panose="020B0503020204020204" pitchFamily="34" charset="-122"/>
+              <a:ea typeface="微软雅黑" panose="020B0503020204020204" pitchFamily="34" charset="-122"/>
+            </a:endParaRPr>
+          </a:p>
+          <a:p>
+            <a:r>
+              <a:rPr lang="en-US" altLang="zh-CN" sz="1400" dirty="0" smtClean="0">
+                <a:solidFill>
+                  <a:srgbClr val="92D050"/>
+                </a:solidFill>
+                <a:latin typeface="微软雅黑" panose="020B0503020204020204" pitchFamily="34" charset="-122"/>
+                <a:ea typeface="微软雅黑" panose="020B0503020204020204" pitchFamily="34" charset="-122"/>
+              </a:rPr>
+              <a:t>【=1】</a:t>
+            </a:r>
+            <a:r>
+              <a:rPr lang="zh-CN" altLang="en-US" sz="1400" dirty="0" smtClean="0">
+                <a:solidFill>
+                  <a:srgbClr val="92D050"/>
+                </a:solidFill>
+                <a:latin typeface="微软雅黑" panose="020B0503020204020204" pitchFamily="34" charset="-122"/>
+                <a:ea typeface="微软雅黑" panose="020B0503020204020204" pitchFamily="34" charset="-122"/>
+              </a:rPr>
+              <a:t>普通的</a:t>
+            </a:r>
+            <a:r>
+              <a:rPr lang="en-US" altLang="zh-CN" sz="1400" dirty="0" smtClean="0">
+                <a:solidFill>
+                  <a:srgbClr val="92D050"/>
+                </a:solidFill>
+                <a:latin typeface="微软雅黑" panose="020B0503020204020204" pitchFamily="34" charset="-122"/>
+                <a:ea typeface="微软雅黑" panose="020B0503020204020204" pitchFamily="34" charset="-122"/>
+              </a:rPr>
+              <a:t>insert</a:t>
+            </a:r>
+            <a:r>
+              <a:rPr lang="zh-CN" altLang="en-US" sz="1400" dirty="0" smtClean="0">
+                <a:solidFill>
+                  <a:srgbClr val="92D050"/>
+                </a:solidFill>
+                <a:latin typeface="微软雅黑" panose="020B0503020204020204" pitchFamily="34" charset="-122"/>
+                <a:ea typeface="微软雅黑" panose="020B0503020204020204" pitchFamily="34" charset="-122"/>
+              </a:rPr>
+              <a:t>语句：自增锁在申请之后就马上释放。</a:t>
+            </a:r>
+            <a:endParaRPr lang="en-US" altLang="zh-CN" sz="1400" dirty="0" smtClean="0">
+              <a:solidFill>
+                <a:srgbClr val="92D050"/>
+              </a:solidFill>
+              <a:latin typeface="微软雅黑" panose="020B0503020204020204" pitchFamily="34" charset="-122"/>
+              <a:ea typeface="微软雅黑" panose="020B0503020204020204" pitchFamily="34" charset="-122"/>
+            </a:endParaRPr>
+          </a:p>
+          <a:p>
+            <a:r>
+              <a:rPr lang="en-US" altLang="zh-CN" sz="1400" dirty="0" smtClean="0">
+                <a:solidFill>
+                  <a:srgbClr val="92D050"/>
+                </a:solidFill>
+                <a:latin typeface="微软雅黑" panose="020B0503020204020204" pitchFamily="34" charset="-122"/>
+                <a:ea typeface="微软雅黑" panose="020B0503020204020204" pitchFamily="34" charset="-122"/>
+              </a:rPr>
+              <a:t>            insert…select </a:t>
+            </a:r>
+            <a:r>
+              <a:rPr lang="zh-CN" altLang="en-US" sz="1400" dirty="0" smtClean="0">
+                <a:solidFill>
+                  <a:srgbClr val="92D050"/>
+                </a:solidFill>
+                <a:latin typeface="微软雅黑" panose="020B0503020204020204" pitchFamily="34" charset="-122"/>
+                <a:ea typeface="微软雅黑" panose="020B0503020204020204" pitchFamily="34" charset="-122"/>
+              </a:rPr>
+              <a:t>批量插入数据的语句，自增锁还是等待语句执行结束后才释放自增锁。</a:t>
+            </a:r>
+            <a:endParaRPr lang="en-US" altLang="zh-CN" sz="1400" dirty="0" smtClean="0">
+              <a:solidFill>
+                <a:srgbClr val="92D050"/>
+              </a:solidFill>
+              <a:latin typeface="微软雅黑" panose="020B0503020204020204" pitchFamily="34" charset="-122"/>
+              <a:ea typeface="微软雅黑" panose="020B0503020204020204" pitchFamily="34" charset="-122"/>
+            </a:endParaRPr>
+          </a:p>
+          <a:p>
+            <a:r>
+              <a:rPr lang="en-US" altLang="zh-CN" sz="1400" dirty="0" smtClean="0">
+                <a:solidFill>
+                  <a:srgbClr val="92D050"/>
+                </a:solidFill>
+                <a:latin typeface="微软雅黑" panose="020B0503020204020204" pitchFamily="34" charset="-122"/>
+                <a:ea typeface="微软雅黑" panose="020B0503020204020204" pitchFamily="34" charset="-122"/>
+              </a:rPr>
+              <a:t>【=3】</a:t>
+            </a:r>
+            <a:r>
+              <a:rPr lang="zh-CN" altLang="en-US" sz="1400" dirty="0" smtClean="0">
+                <a:solidFill>
+                  <a:srgbClr val="92D050"/>
+                </a:solidFill>
+                <a:latin typeface="微软雅黑" panose="020B0503020204020204" pitchFamily="34" charset="-122"/>
+                <a:ea typeface="微软雅黑" panose="020B0503020204020204" pitchFamily="34" charset="-122"/>
+              </a:rPr>
+              <a:t>所有申请自增主键动作都是申请后就释放锁（建议</a:t>
+            </a:r>
+            <a:r>
+              <a:rPr lang="en-US" altLang="zh-CN" sz="1400" dirty="0" err="1" smtClean="0">
+                <a:solidFill>
+                  <a:srgbClr val="92D050"/>
+                </a:solidFill>
+                <a:latin typeface="微软雅黑" panose="020B0503020204020204" pitchFamily="34" charset="-122"/>
+                <a:ea typeface="微软雅黑" panose="020B0503020204020204" pitchFamily="34" charset="-122"/>
+              </a:rPr>
+              <a:t>binlog</a:t>
+            </a:r>
+            <a:r>
+              <a:rPr lang="en-US" altLang="zh-CN" sz="1400" dirty="0" smtClean="0">
+                <a:solidFill>
+                  <a:srgbClr val="92D050"/>
+                </a:solidFill>
+                <a:latin typeface="微软雅黑" panose="020B0503020204020204" pitchFamily="34" charset="-122"/>
+                <a:ea typeface="微软雅黑" panose="020B0503020204020204" pitchFamily="34" charset="-122"/>
+              </a:rPr>
+              <a:t> format=row</a:t>
+            </a:r>
+            <a:r>
+              <a:rPr lang="zh-CN" altLang="en-US" sz="1400" dirty="0" smtClean="0">
+                <a:solidFill>
+                  <a:srgbClr val="92D050"/>
+                </a:solidFill>
+                <a:latin typeface="微软雅黑" panose="020B0503020204020204" pitchFamily="34" charset="-122"/>
+                <a:ea typeface="微软雅黑" panose="020B0503020204020204" pitchFamily="34" charset="-122"/>
+              </a:rPr>
+              <a:t>）</a:t>
+            </a:r>
+            <a:endParaRPr lang="en-US" altLang="zh-CN" sz="1400" dirty="0">
+              <a:solidFill>
+                <a:srgbClr val="92D050"/>
+              </a:solidFill>
+              <a:latin typeface="微软雅黑" panose="020B0503020204020204" pitchFamily="34" charset="-122"/>
+              <a:ea typeface="微软雅黑" panose="020B0503020204020204" pitchFamily="34" charset="-122"/>
+            </a:endParaRPr>
+          </a:p>
+        </p:txBody>
+      </p:sp>
+      <p:sp>
+        <p:nvSpPr>
+          <p:cNvPr id="12" name="矩形 11"/>
+          <p:cNvSpPr/>
+          <p:nvPr/>
+        </p:nvSpPr>
+        <p:spPr>
+          <a:xfrm>
+            <a:off x="198120" y="2711097"/>
+            <a:ext cx="6949440" cy="307777"/>
+          </a:xfrm>
+          <a:prstGeom prst="rect">
+            <a:avLst/>
+          </a:prstGeom>
+        </p:spPr>
+        <p:txBody>
+          <a:bodyPr wrap="square">
+            <a:spAutoFit/>
+          </a:bodyPr>
+          <a:lstStyle/>
+          <a:p>
+            <a:r>
+              <a:rPr lang="zh-CN" altLang="en-US" sz="1400" dirty="0" smtClean="0">
+                <a:solidFill>
+                  <a:srgbClr val="FFFF00"/>
+                </a:solidFill>
+                <a:latin typeface="微软雅黑" panose="020B0503020204020204" pitchFamily="34" charset="-122"/>
+                <a:ea typeface="微软雅黑" panose="020B0503020204020204" pitchFamily="34" charset="-122"/>
+              </a:rPr>
+              <a:t>为什么</a:t>
+            </a:r>
+            <a:r>
+              <a:rPr lang="en-US" altLang="zh-CN" sz="1400" dirty="0" err="1" smtClean="0">
+                <a:solidFill>
+                  <a:srgbClr val="FFFF00"/>
+                </a:solidFill>
+                <a:latin typeface="微软雅黑" panose="020B0503020204020204" pitchFamily="34" charset="-122"/>
+                <a:ea typeface="微软雅黑" panose="020B0503020204020204" pitchFamily="34" charset="-122"/>
+              </a:rPr>
+              <a:t>innodb_autoinc_lock_mod</a:t>
+            </a:r>
+            <a:r>
+              <a:rPr lang="en-US" altLang="zh-CN" sz="1400" dirty="0" smtClean="0">
+                <a:solidFill>
+                  <a:srgbClr val="FFFF00"/>
+                </a:solidFill>
+                <a:latin typeface="微软雅黑" panose="020B0503020204020204" pitchFamily="34" charset="-122"/>
+                <a:ea typeface="微软雅黑" panose="020B0503020204020204" pitchFamily="34" charset="-122"/>
+              </a:rPr>
+              <a:t>=2</a:t>
+            </a:r>
+            <a:r>
+              <a:rPr lang="zh-CN" altLang="en-US" sz="1400" dirty="0" smtClean="0">
+                <a:solidFill>
+                  <a:srgbClr val="FFFF00"/>
+                </a:solidFill>
+                <a:latin typeface="微软雅黑" panose="020B0503020204020204" pitchFamily="34" charset="-122"/>
+                <a:ea typeface="微软雅黑" panose="020B0503020204020204" pitchFamily="34" charset="-122"/>
+              </a:rPr>
+              <a:t>时</a:t>
+            </a:r>
+            <a:r>
+              <a:rPr lang="en-US" altLang="zh-CN" sz="1400" dirty="0" smtClean="0">
+                <a:solidFill>
+                  <a:srgbClr val="FFFF00"/>
+                </a:solidFill>
+                <a:latin typeface="微软雅黑" panose="020B0503020204020204" pitchFamily="34" charset="-122"/>
+                <a:ea typeface="微软雅黑" panose="020B0503020204020204" pitchFamily="34" charset="-122"/>
+              </a:rPr>
+              <a:t>insert…select </a:t>
+            </a:r>
+            <a:r>
+              <a:rPr lang="zh-CN" altLang="en-US" sz="1400" dirty="0" smtClean="0">
+                <a:solidFill>
+                  <a:srgbClr val="FFFF00"/>
+                </a:solidFill>
+                <a:latin typeface="微软雅黑" panose="020B0503020204020204" pitchFamily="34" charset="-122"/>
+                <a:ea typeface="微软雅黑" panose="020B0503020204020204" pitchFamily="34" charset="-122"/>
+              </a:rPr>
+              <a:t>要使用语句级的自增锁？</a:t>
+            </a:r>
+            <a:endParaRPr lang="en-US" altLang="zh-CN" sz="1400" dirty="0" smtClean="0">
+              <a:solidFill>
+                <a:srgbClr val="FFFF00"/>
+              </a:solidFill>
+              <a:latin typeface="微软雅黑" panose="020B0503020204020204" pitchFamily="34" charset="-122"/>
+              <a:ea typeface="微软雅黑" panose="020B0503020204020204" pitchFamily="34" charset="-122"/>
+            </a:endParaRPr>
+          </a:p>
+        </p:txBody>
+      </p:sp>
+      <p:graphicFrame>
+        <p:nvGraphicFramePr>
+          <p:cNvPr id="13" name="表格 12"/>
+          <p:cNvGraphicFramePr>
+            <a:graphicFrameLocks noGrp="1"/>
+          </p:cNvGraphicFramePr>
+          <p:nvPr>
+            <p:extLst>
+              <p:ext uri="{D42A27DB-BD31-4B8C-83A1-F6EECF244321}">
+                <p14:modId xmlns:p14="http://schemas.microsoft.com/office/powerpoint/2010/main" val="2447975968"/>
+              </p:ext>
+            </p:extLst>
+          </p:nvPr>
+        </p:nvGraphicFramePr>
+        <p:xfrm>
+          <a:off x="284754" y="3133533"/>
+          <a:ext cx="5620746" cy="1620762"/>
+        </p:xfrm>
+        <a:graphic>
+          <a:graphicData uri="http://schemas.openxmlformats.org/drawingml/2006/table">
+            <a:tbl>
+              <a:tblPr firstRow="1" bandRow="1">
+                <a:tableStyleId>{5C22544A-7EE6-4342-B048-85BDC9FD1C3A}</a:tableStyleId>
+              </a:tblPr>
+              <a:tblGrid>
+                <a:gridCol w="2784973">
+                  <a:extLst>
+                    <a:ext uri="{9D8B030D-6E8A-4147-A177-3AD203B41FA5}">
+                      <a16:colId xmlns:a16="http://schemas.microsoft.com/office/drawing/2014/main" val="3946032188"/>
+                    </a:ext>
+                  </a:extLst>
+                </a:gridCol>
+                <a:gridCol w="2835773">
+                  <a:extLst>
+                    <a:ext uri="{9D8B030D-6E8A-4147-A177-3AD203B41FA5}">
+                      <a16:colId xmlns:a16="http://schemas.microsoft.com/office/drawing/2014/main" val="2005659843"/>
+                    </a:ext>
+                  </a:extLst>
+                </a:gridCol>
+              </a:tblGrid>
+              <a:tr h="326894">
+                <a:tc>
+                  <a:txBody>
+                    <a:bodyPr/>
+                    <a:lstStyle/>
+                    <a:p>
+                      <a:r>
+                        <a:rPr lang="zh-CN" altLang="en-US" sz="1200" dirty="0" smtClean="0">
+                          <a:solidFill>
+                            <a:schemeClr val="tx1"/>
+                          </a:solidFill>
+                          <a:latin typeface="微软雅黑" panose="020B0503020204020204" pitchFamily="34" charset="-122"/>
+                          <a:ea typeface="微软雅黑" panose="020B0503020204020204" pitchFamily="34" charset="-122"/>
+                        </a:rPr>
+                        <a:t>事务</a:t>
+                      </a:r>
+                      <a:r>
+                        <a:rPr lang="en-US" altLang="zh-CN" sz="1200" dirty="0" smtClean="0">
+                          <a:solidFill>
+                            <a:schemeClr val="tx1"/>
+                          </a:solidFill>
+                          <a:latin typeface="微软雅黑" panose="020B0503020204020204" pitchFamily="34" charset="-122"/>
+                          <a:ea typeface="微软雅黑" panose="020B0503020204020204" pitchFamily="34" charset="-122"/>
+                        </a:rPr>
+                        <a:t>A</a:t>
+                      </a:r>
+                      <a:r>
+                        <a:rPr lang="zh-CN" altLang="en-US" sz="1200" dirty="0" smtClean="0">
+                          <a:solidFill>
+                            <a:schemeClr val="tx1"/>
+                          </a:solidFill>
+                          <a:latin typeface="微软雅黑" panose="020B0503020204020204" pitchFamily="34" charset="-122"/>
+                          <a:ea typeface="微软雅黑" panose="020B0503020204020204" pitchFamily="34" charset="-122"/>
+                        </a:rPr>
+                        <a:t>执行</a:t>
+                      </a:r>
+                      <a:endParaRPr lang="en-US" altLang="zh-CN" sz="1200" dirty="0" smtClean="0">
+                        <a:solidFill>
+                          <a:schemeClr val="tx1"/>
+                        </a:solidFill>
+                        <a:latin typeface="微软雅黑" panose="020B0503020204020204" pitchFamily="34" charset="-122"/>
+                        <a:ea typeface="微软雅黑" panose="020B0503020204020204" pitchFamily="34" charset="-122"/>
+                      </a:endParaRPr>
+                    </a:p>
+                    <a:p>
+                      <a:r>
+                        <a:rPr lang="en-US" altLang="zh-CN" sz="1200" dirty="0" smtClean="0">
+                          <a:solidFill>
+                            <a:schemeClr val="tx1"/>
+                          </a:solidFill>
+                          <a:latin typeface="微软雅黑" panose="020B0503020204020204" pitchFamily="34" charset="-122"/>
+                          <a:ea typeface="微软雅黑" panose="020B0503020204020204" pitchFamily="34" charset="-122"/>
+                        </a:rPr>
+                        <a:t>insert into t2 values (null, 5,5);</a:t>
+                      </a:r>
+                      <a:endParaRPr lang="zh-CN" altLang="en-US" sz="1200" dirty="0">
+                        <a:solidFill>
+                          <a:schemeClr val="tx1"/>
+                        </a:solidFill>
+                        <a:latin typeface="微软雅黑" panose="020B0503020204020204" pitchFamily="34" charset="-122"/>
+                        <a:ea typeface="微软雅黑" panose="020B0503020204020204" pitchFamily="34" charset="-122"/>
+                      </a:endParaRPr>
+                    </a:p>
+                  </a:txBody>
+                  <a:tcPr/>
+                </a:tc>
+                <a:tc>
+                  <a:txBody>
+                    <a:bodyPr/>
+                    <a:lstStyle/>
+                    <a:p>
+                      <a:r>
+                        <a:rPr lang="zh-CN" altLang="en-US" sz="1200" dirty="0" smtClean="0">
+                          <a:solidFill>
+                            <a:schemeClr val="tx1"/>
+                          </a:solidFill>
+                          <a:latin typeface="微软雅黑" panose="020B0503020204020204" pitchFamily="34" charset="-122"/>
+                          <a:ea typeface="微软雅黑" panose="020B0503020204020204" pitchFamily="34" charset="-122"/>
+                        </a:rPr>
+                        <a:t>事务</a:t>
+                      </a:r>
+                      <a:r>
+                        <a:rPr lang="en-US" altLang="zh-CN" sz="1200" dirty="0" smtClean="0">
+                          <a:solidFill>
+                            <a:schemeClr val="tx1"/>
+                          </a:solidFill>
+                          <a:latin typeface="微软雅黑" panose="020B0503020204020204" pitchFamily="34" charset="-122"/>
+                          <a:ea typeface="微软雅黑" panose="020B0503020204020204" pitchFamily="34" charset="-122"/>
+                        </a:rPr>
+                        <a:t>B</a:t>
+                      </a:r>
+                      <a:r>
+                        <a:rPr lang="zh-CN" altLang="en-US" sz="1200" dirty="0" smtClean="0">
+                          <a:solidFill>
+                            <a:schemeClr val="tx1"/>
+                          </a:solidFill>
+                          <a:latin typeface="微软雅黑" panose="020B0503020204020204" pitchFamily="34" charset="-122"/>
+                          <a:ea typeface="微软雅黑" panose="020B0503020204020204" pitchFamily="34" charset="-122"/>
+                        </a:rPr>
+                        <a:t>执行</a:t>
+                      </a:r>
+                      <a:endParaRPr lang="en-US" altLang="zh-CN" sz="1200" dirty="0" smtClean="0">
+                        <a:solidFill>
+                          <a:schemeClr val="tx1"/>
+                        </a:solidFill>
+                        <a:latin typeface="微软雅黑" panose="020B0503020204020204" pitchFamily="34" charset="-122"/>
+                        <a:ea typeface="微软雅黑" panose="020B0503020204020204" pitchFamily="34" charset="-122"/>
+                      </a:endParaRPr>
+                    </a:p>
+                    <a:p>
+                      <a:r>
+                        <a:rPr lang="en-US" altLang="zh-CN" sz="1200" dirty="0" smtClean="0">
+                          <a:solidFill>
+                            <a:schemeClr val="tx1"/>
+                          </a:solidFill>
+                          <a:latin typeface="微软雅黑" panose="020B0503020204020204" pitchFamily="34" charset="-122"/>
+                          <a:ea typeface="微软雅黑" panose="020B0503020204020204" pitchFamily="34" charset="-122"/>
+                        </a:rPr>
+                        <a:t>insert into t2(</a:t>
+                      </a:r>
+                      <a:r>
+                        <a:rPr lang="en-US" altLang="zh-CN" sz="1200" dirty="0" err="1" smtClean="0">
+                          <a:solidFill>
+                            <a:schemeClr val="tx1"/>
+                          </a:solidFill>
+                          <a:latin typeface="微软雅黑" panose="020B0503020204020204" pitchFamily="34" charset="-122"/>
+                          <a:ea typeface="微软雅黑" panose="020B0503020204020204" pitchFamily="34" charset="-122"/>
+                        </a:rPr>
+                        <a:t>c,d</a:t>
+                      </a:r>
+                      <a:r>
+                        <a:rPr lang="en-US" altLang="zh-CN" sz="1200" dirty="0" smtClean="0">
+                          <a:solidFill>
+                            <a:schemeClr val="tx1"/>
+                          </a:solidFill>
+                          <a:latin typeface="微软雅黑" panose="020B0503020204020204" pitchFamily="34" charset="-122"/>
+                          <a:ea typeface="微软雅黑" panose="020B0503020204020204" pitchFamily="34" charset="-122"/>
+                        </a:rPr>
+                        <a:t>)</a:t>
+                      </a:r>
+                      <a:r>
+                        <a:rPr lang="en-US" altLang="zh-CN" sz="1200" baseline="0" dirty="0" smtClean="0">
+                          <a:solidFill>
+                            <a:schemeClr val="tx1"/>
+                          </a:solidFill>
+                          <a:latin typeface="微软雅黑" panose="020B0503020204020204" pitchFamily="34" charset="-122"/>
+                          <a:ea typeface="微软雅黑" panose="020B0503020204020204" pitchFamily="34" charset="-122"/>
+                        </a:rPr>
+                        <a:t> select </a:t>
+                      </a:r>
+                      <a:r>
+                        <a:rPr lang="en-US" altLang="zh-CN" sz="1200" baseline="0" dirty="0" err="1" smtClean="0">
+                          <a:solidFill>
+                            <a:schemeClr val="tx1"/>
+                          </a:solidFill>
+                          <a:latin typeface="微软雅黑" panose="020B0503020204020204" pitchFamily="34" charset="-122"/>
+                          <a:ea typeface="微软雅黑" panose="020B0503020204020204" pitchFamily="34" charset="-122"/>
+                        </a:rPr>
+                        <a:t>c,d</a:t>
+                      </a:r>
+                      <a:r>
+                        <a:rPr lang="en-US" altLang="zh-CN" sz="1200" baseline="0" dirty="0" smtClean="0">
+                          <a:solidFill>
+                            <a:schemeClr val="tx1"/>
+                          </a:solidFill>
+                          <a:latin typeface="微软雅黑" panose="020B0503020204020204" pitchFamily="34" charset="-122"/>
+                          <a:ea typeface="微软雅黑" panose="020B0503020204020204" pitchFamily="34" charset="-122"/>
+                        </a:rPr>
+                        <a:t> from t;</a:t>
+                      </a:r>
+                    </a:p>
+                    <a:p>
+                      <a:r>
+                        <a:rPr lang="en-US" altLang="zh-CN" sz="1200" baseline="0" dirty="0" smtClean="0">
+                          <a:solidFill>
+                            <a:schemeClr val="tx1"/>
+                          </a:solidFill>
+                          <a:latin typeface="微软雅黑" panose="020B0503020204020204" pitchFamily="34" charset="-122"/>
+                          <a:ea typeface="微软雅黑" panose="020B0503020204020204" pitchFamily="34" charset="-122"/>
+                        </a:rPr>
+                        <a:t>t</a:t>
+                      </a:r>
+                      <a:r>
+                        <a:rPr lang="zh-CN" altLang="en-US" sz="1200" baseline="0" dirty="0" smtClean="0">
+                          <a:solidFill>
+                            <a:schemeClr val="tx1"/>
+                          </a:solidFill>
+                          <a:latin typeface="微软雅黑" panose="020B0503020204020204" pitchFamily="34" charset="-122"/>
+                          <a:ea typeface="微软雅黑" panose="020B0503020204020204" pitchFamily="34" charset="-122"/>
+                        </a:rPr>
+                        <a:t>中已有</a:t>
+                      </a:r>
+                      <a:r>
+                        <a:rPr lang="en-US" altLang="zh-CN" sz="1200" baseline="0" dirty="0" smtClean="0">
+                          <a:solidFill>
+                            <a:schemeClr val="tx1"/>
+                          </a:solidFill>
+                          <a:latin typeface="微软雅黑" panose="020B0503020204020204" pitchFamily="34" charset="-122"/>
+                          <a:ea typeface="微软雅黑" panose="020B0503020204020204" pitchFamily="34" charset="-122"/>
+                        </a:rPr>
+                        <a:t>(1,1)(2,2)(3,3)(4,4)</a:t>
+                      </a:r>
+                    </a:p>
+                  </a:txBody>
+                  <a:tcPr/>
+                </a:tc>
+                <a:extLst>
+                  <a:ext uri="{0D108BD9-81ED-4DB2-BD59-A6C34878D82A}">
+                    <a16:rowId xmlns:a16="http://schemas.microsoft.com/office/drawing/2014/main" val="1827706926"/>
+                  </a:ext>
+                </a:extLst>
+              </a:tr>
+              <a:tr h="326894">
+                <a:tc>
+                  <a:txBody>
+                    <a:bodyPr/>
+                    <a:lstStyle/>
+                    <a:p>
+                      <a:endParaRPr lang="en-US" altLang="zh-CN" sz="1200" baseline="0" dirty="0" smtClean="0">
+                        <a:solidFill>
+                          <a:schemeClr val="bg1"/>
+                        </a:solidFill>
+                        <a:latin typeface="微软雅黑" panose="020B0503020204020204" pitchFamily="34" charset="-122"/>
+                        <a:ea typeface="微软雅黑" panose="020B0503020204020204" pitchFamily="34" charset="-122"/>
+                      </a:endParaRPr>
+                    </a:p>
+                  </a:txBody>
+                  <a:tcPr/>
+                </a:tc>
+                <a:tc>
+                  <a:txBody>
+                    <a:bodyPr/>
+                    <a:lstStyle/>
+                    <a:p>
+                      <a:r>
+                        <a:rPr lang="en-US" altLang="zh-CN" sz="1200" dirty="0" smtClean="0">
+                          <a:solidFill>
+                            <a:schemeClr val="bg1"/>
+                          </a:solidFill>
+                          <a:latin typeface="微软雅黑" panose="020B0503020204020204" pitchFamily="34" charset="-122"/>
+                          <a:ea typeface="微软雅黑" panose="020B0503020204020204" pitchFamily="34" charset="-122"/>
+                        </a:rPr>
+                        <a:t>insert (1,1,1)  (2,2,2)</a:t>
+                      </a:r>
+                    </a:p>
+                  </a:txBody>
+                  <a:tcPr/>
+                </a:tc>
+                <a:extLst>
+                  <a:ext uri="{0D108BD9-81ED-4DB2-BD59-A6C34878D82A}">
+                    <a16:rowId xmlns:a16="http://schemas.microsoft.com/office/drawing/2014/main" val="3274968019"/>
+                  </a:ext>
+                </a:extLst>
+              </a:tr>
+              <a:tr h="326894">
+                <a:tc>
+                  <a:txBody>
+                    <a:bodyPr/>
+                    <a:lstStyle/>
+                    <a:p>
+                      <a:r>
+                        <a:rPr lang="zh-CN" altLang="en-US" sz="1200" dirty="0" smtClean="0">
+                          <a:solidFill>
+                            <a:schemeClr val="bg1"/>
+                          </a:solidFill>
+                          <a:latin typeface="微软雅黑" panose="020B0503020204020204" pitchFamily="34" charset="-122"/>
+                          <a:ea typeface="微软雅黑" panose="020B0503020204020204" pitchFamily="34" charset="-122"/>
+                        </a:rPr>
+                        <a:t>申请得到自增</a:t>
+                      </a:r>
+                      <a:r>
+                        <a:rPr lang="en-US" altLang="zh-CN" sz="1200" dirty="0" smtClean="0">
+                          <a:solidFill>
+                            <a:schemeClr val="bg1"/>
+                          </a:solidFill>
+                          <a:latin typeface="微软雅黑" panose="020B0503020204020204" pitchFamily="34" charset="-122"/>
+                          <a:ea typeface="微软雅黑" panose="020B0503020204020204" pitchFamily="34" charset="-122"/>
+                        </a:rPr>
+                        <a:t>id=3</a:t>
+                      </a:r>
+                      <a:r>
+                        <a:rPr lang="zh-CN" altLang="en-US" sz="1200" dirty="0" smtClean="0">
+                          <a:solidFill>
+                            <a:schemeClr val="bg1"/>
+                          </a:solidFill>
+                          <a:latin typeface="微软雅黑" panose="020B0503020204020204" pitchFamily="34" charset="-122"/>
+                          <a:ea typeface="微软雅黑" panose="020B0503020204020204" pitchFamily="34" charset="-122"/>
+                        </a:rPr>
+                        <a:t>，</a:t>
+                      </a:r>
+                      <a:r>
+                        <a:rPr lang="en-US" altLang="zh-CN" sz="1200" dirty="0" smtClean="0">
+                          <a:solidFill>
+                            <a:schemeClr val="bg1"/>
+                          </a:solidFill>
+                          <a:latin typeface="微软雅黑" panose="020B0503020204020204" pitchFamily="34" charset="-122"/>
+                          <a:ea typeface="微软雅黑" panose="020B0503020204020204" pitchFamily="34" charset="-122"/>
+                        </a:rPr>
+                        <a:t>insert (3,5,5)</a:t>
+                      </a:r>
+                      <a:endParaRPr lang="zh-CN" altLang="en-US" sz="1200" dirty="0">
+                        <a:solidFill>
+                          <a:schemeClr val="bg1"/>
+                        </a:solidFill>
+                        <a:latin typeface="微软雅黑" panose="020B0503020204020204" pitchFamily="34" charset="-122"/>
+                        <a:ea typeface="微软雅黑" panose="020B0503020204020204" pitchFamily="34" charset="-122"/>
+                      </a:endParaRPr>
+                    </a:p>
+                  </a:txBody>
+                  <a:tcPr/>
+                </a:tc>
+                <a:tc>
+                  <a:txBody>
+                    <a:bodyPr/>
+                    <a:lstStyle/>
+                    <a:p>
+                      <a:endParaRPr lang="zh-CN" altLang="en-US" sz="1200" dirty="0">
+                        <a:solidFill>
+                          <a:schemeClr val="bg1"/>
+                        </a:solidFill>
+                        <a:latin typeface="微软雅黑" panose="020B0503020204020204" pitchFamily="34" charset="-122"/>
+                        <a:ea typeface="微软雅黑" panose="020B0503020204020204" pitchFamily="34" charset="-122"/>
+                      </a:endParaRPr>
+                    </a:p>
+                  </a:txBody>
+                  <a:tcPr/>
+                </a:tc>
+                <a:extLst>
+                  <a:ext uri="{0D108BD9-81ED-4DB2-BD59-A6C34878D82A}">
+                    <a16:rowId xmlns:a16="http://schemas.microsoft.com/office/drawing/2014/main" val="4026781452"/>
+                  </a:ext>
+                </a:extLst>
+              </a:tr>
+              <a:tr h="326894">
+                <a:tc>
+                  <a:txBody>
+                    <a:bodyPr/>
+                    <a:lstStyle/>
+                    <a:p>
+                      <a:endParaRPr lang="en-US" altLang="zh-CN" sz="1200" baseline="0" dirty="0" smtClean="0">
+                        <a:solidFill>
+                          <a:schemeClr val="accent1">
+                            <a:lumMod val="60000"/>
+                            <a:lumOff val="40000"/>
+                          </a:schemeClr>
+                        </a:solidFill>
+                        <a:latin typeface="微软雅黑" panose="020B0503020204020204" pitchFamily="34" charset="-122"/>
+                        <a:ea typeface="微软雅黑" panose="020B0503020204020204" pitchFamily="34" charset="-122"/>
+                      </a:endParaRPr>
+                    </a:p>
+                  </a:txBody>
+                  <a:tcPr/>
+                </a:tc>
+                <a:tc>
+                  <a:txBody>
+                    <a:bodyPr/>
+                    <a:lstStyle/>
+                    <a:p>
+                      <a:r>
+                        <a:rPr lang="en-US" altLang="zh-CN" sz="1200" dirty="0" smtClean="0">
+                          <a:solidFill>
+                            <a:schemeClr val="bg1"/>
+                          </a:solidFill>
+                          <a:latin typeface="微软雅黑" panose="020B0503020204020204" pitchFamily="34" charset="-122"/>
+                          <a:ea typeface="微软雅黑" panose="020B0503020204020204" pitchFamily="34" charset="-122"/>
+                        </a:rPr>
+                        <a:t>insert (4,3,3)  (5,4,4)</a:t>
+                      </a:r>
+                      <a:endParaRPr lang="zh-CN" altLang="en-US" sz="1200" dirty="0">
+                        <a:solidFill>
+                          <a:schemeClr val="bg1"/>
+                        </a:solidFill>
+                        <a:latin typeface="微软雅黑" panose="020B0503020204020204" pitchFamily="34" charset="-122"/>
+                        <a:ea typeface="微软雅黑" panose="020B0503020204020204" pitchFamily="34" charset="-122"/>
+                      </a:endParaRPr>
+                    </a:p>
+                  </a:txBody>
+                  <a:tcPr/>
+                </a:tc>
+                <a:extLst>
+                  <a:ext uri="{0D108BD9-81ED-4DB2-BD59-A6C34878D82A}">
+                    <a16:rowId xmlns:a16="http://schemas.microsoft.com/office/drawing/2014/main" val="3767319794"/>
+                  </a:ext>
+                </a:extLst>
+              </a:tr>
+            </a:tbl>
+          </a:graphicData>
+        </a:graphic>
+      </p:graphicFrame>
+      <p:graphicFrame>
+        <p:nvGraphicFramePr>
+          <p:cNvPr id="14" name="表格 13"/>
+          <p:cNvGraphicFramePr>
+            <a:graphicFrameLocks noGrp="1"/>
+          </p:cNvGraphicFramePr>
+          <p:nvPr>
+            <p:extLst>
+              <p:ext uri="{D42A27DB-BD31-4B8C-83A1-F6EECF244321}">
+                <p14:modId xmlns:p14="http://schemas.microsoft.com/office/powerpoint/2010/main" val="961338529"/>
+              </p:ext>
+            </p:extLst>
+          </p:nvPr>
+        </p:nvGraphicFramePr>
+        <p:xfrm>
+          <a:off x="10110651" y="1381901"/>
+          <a:ext cx="1942487" cy="1961364"/>
+        </p:xfrm>
+        <a:graphic>
+          <a:graphicData uri="http://schemas.openxmlformats.org/drawingml/2006/table">
+            <a:tbl>
+              <a:tblPr firstRow="1" bandRow="1">
+                <a:tableStyleId>{5C22544A-7EE6-4342-B048-85BDC9FD1C3A}</a:tableStyleId>
+              </a:tblPr>
+              <a:tblGrid>
+                <a:gridCol w="1942487">
+                  <a:extLst>
+                    <a:ext uri="{9D8B030D-6E8A-4147-A177-3AD203B41FA5}">
+                      <a16:colId xmlns:a16="http://schemas.microsoft.com/office/drawing/2014/main" val="3946032188"/>
+                    </a:ext>
+                  </a:extLst>
+                </a:gridCol>
+              </a:tblGrid>
+              <a:tr h="326894">
+                <a:tc>
+                  <a:txBody>
+                    <a:bodyPr/>
+                    <a:lstStyle/>
+                    <a:p>
+                      <a:r>
+                        <a:rPr lang="zh-CN" altLang="en-US" sz="1200" dirty="0" smtClean="0">
+                          <a:solidFill>
+                            <a:schemeClr val="tx1"/>
+                          </a:solidFill>
+                          <a:latin typeface="微软雅黑" panose="020B0503020204020204" pitchFamily="34" charset="-122"/>
+                          <a:ea typeface="微软雅黑" panose="020B0503020204020204" pitchFamily="34" charset="-122"/>
+                        </a:rPr>
+                        <a:t>备库执行</a:t>
+                      </a:r>
+                      <a:endParaRPr lang="zh-CN" altLang="en-US" sz="1200" dirty="0">
+                        <a:solidFill>
+                          <a:schemeClr val="tx1"/>
+                        </a:solidFill>
+                        <a:latin typeface="微软雅黑" panose="020B0503020204020204" pitchFamily="34" charset="-122"/>
+                        <a:ea typeface="微软雅黑" panose="020B0503020204020204" pitchFamily="34" charset="-122"/>
+                      </a:endParaRPr>
+                    </a:p>
+                  </a:txBody>
+                  <a:tcPr/>
+                </a:tc>
+                <a:extLst>
+                  <a:ext uri="{0D108BD9-81ED-4DB2-BD59-A6C34878D82A}">
+                    <a16:rowId xmlns:a16="http://schemas.microsoft.com/office/drawing/2014/main" val="1827706926"/>
+                  </a:ext>
+                </a:extLst>
+              </a:tr>
+              <a:tr h="326894">
+                <a:tc>
+                  <a:txBody>
+                    <a:bodyPr/>
+                    <a:lstStyle/>
+                    <a:p>
+                      <a:r>
+                        <a:rPr lang="en-US" altLang="zh-CN" sz="1200" baseline="0" dirty="0" smtClean="0">
+                          <a:solidFill>
+                            <a:schemeClr val="bg1"/>
+                          </a:solidFill>
+                          <a:latin typeface="微软雅黑" panose="020B0503020204020204" pitchFamily="34" charset="-122"/>
+                          <a:ea typeface="微软雅黑" panose="020B0503020204020204" pitchFamily="34" charset="-122"/>
+                        </a:rPr>
+                        <a:t>insert(1,5,5)</a:t>
+                      </a:r>
+                    </a:p>
+                  </a:txBody>
+                  <a:tcPr/>
+                </a:tc>
+                <a:extLst>
+                  <a:ext uri="{0D108BD9-81ED-4DB2-BD59-A6C34878D82A}">
+                    <a16:rowId xmlns:a16="http://schemas.microsoft.com/office/drawing/2014/main" val="3274968019"/>
+                  </a:ext>
+                </a:extLst>
+              </a:tr>
+              <a:tr h="326894">
+                <a:tc>
+                  <a:txBody>
+                    <a:bodyPr/>
+                    <a:lstStyle/>
+                    <a:p>
+                      <a:r>
+                        <a:rPr lang="en-US" altLang="zh-CN" sz="1200" dirty="0" smtClean="0">
+                          <a:solidFill>
+                            <a:schemeClr val="bg1"/>
+                          </a:solidFill>
+                          <a:latin typeface="微软雅黑" panose="020B0503020204020204" pitchFamily="34" charset="-122"/>
+                          <a:ea typeface="微软雅黑" panose="020B0503020204020204" pitchFamily="34" charset="-122"/>
+                        </a:rPr>
+                        <a:t>insert(2,1,1)</a:t>
+                      </a:r>
+                    </a:p>
+                  </a:txBody>
+                  <a:tcPr/>
+                </a:tc>
+                <a:extLst>
+                  <a:ext uri="{0D108BD9-81ED-4DB2-BD59-A6C34878D82A}">
+                    <a16:rowId xmlns:a16="http://schemas.microsoft.com/office/drawing/2014/main" val="4026781452"/>
+                  </a:ext>
+                </a:extLst>
+              </a:tr>
+              <a:tr h="326894">
+                <a:tc>
+                  <a:txBody>
+                    <a:bodyPr/>
+                    <a:lstStyle/>
+                    <a:p>
+                      <a:r>
+                        <a:rPr lang="en-US" altLang="zh-CN" sz="1200" baseline="0" dirty="0" smtClean="0">
+                          <a:solidFill>
+                            <a:schemeClr val="bg1"/>
+                          </a:solidFill>
+                          <a:latin typeface="微软雅黑" panose="020B0503020204020204" pitchFamily="34" charset="-122"/>
+                          <a:ea typeface="微软雅黑" panose="020B0503020204020204" pitchFamily="34" charset="-122"/>
+                        </a:rPr>
+                        <a:t>insert(3,2,2)</a:t>
+                      </a:r>
+                    </a:p>
+                  </a:txBody>
+                  <a:tcPr/>
+                </a:tc>
+                <a:extLst>
+                  <a:ext uri="{0D108BD9-81ED-4DB2-BD59-A6C34878D82A}">
+                    <a16:rowId xmlns:a16="http://schemas.microsoft.com/office/drawing/2014/main" val="3767319794"/>
+                  </a:ext>
+                </a:extLst>
+              </a:tr>
+              <a:tr h="326894">
+                <a:tc>
+                  <a:txBody>
+                    <a:bodyPr/>
+                    <a:lstStyle/>
+                    <a:p>
+                      <a:r>
+                        <a:rPr lang="en-US" altLang="zh-CN" sz="1200" baseline="0" dirty="0" smtClean="0">
+                          <a:solidFill>
+                            <a:schemeClr val="bg1"/>
+                          </a:solidFill>
+                          <a:latin typeface="微软雅黑" panose="020B0503020204020204" pitchFamily="34" charset="-122"/>
+                          <a:ea typeface="微软雅黑" panose="020B0503020204020204" pitchFamily="34" charset="-122"/>
+                        </a:rPr>
+                        <a:t>insert(4,3,3)</a:t>
+                      </a:r>
+                    </a:p>
+                  </a:txBody>
+                  <a:tcPr/>
+                </a:tc>
+                <a:extLst>
+                  <a:ext uri="{0D108BD9-81ED-4DB2-BD59-A6C34878D82A}">
+                    <a16:rowId xmlns:a16="http://schemas.microsoft.com/office/drawing/2014/main" val="3436968484"/>
+                  </a:ext>
+                </a:extLst>
+              </a:tr>
+              <a:tr h="326894">
+                <a:tc>
+                  <a:txBody>
+                    <a:bodyPr/>
+                    <a:lstStyle/>
+                    <a:p>
+                      <a:r>
+                        <a:rPr lang="en-US" altLang="zh-CN" sz="1200" baseline="0" dirty="0" smtClean="0">
+                          <a:solidFill>
+                            <a:schemeClr val="bg1"/>
+                          </a:solidFill>
+                          <a:latin typeface="微软雅黑" panose="020B0503020204020204" pitchFamily="34" charset="-122"/>
+                          <a:ea typeface="微软雅黑" panose="020B0503020204020204" pitchFamily="34" charset="-122"/>
+                        </a:rPr>
+                        <a:t>insert(5,4,4)</a:t>
+                      </a:r>
+                    </a:p>
+                  </a:txBody>
+                  <a:tcPr/>
+                </a:tc>
+                <a:extLst>
+                  <a:ext uri="{0D108BD9-81ED-4DB2-BD59-A6C34878D82A}">
+                    <a16:rowId xmlns:a16="http://schemas.microsoft.com/office/drawing/2014/main" val="1156885343"/>
+                  </a:ext>
+                </a:extLst>
+              </a:tr>
+            </a:tbl>
+          </a:graphicData>
+        </a:graphic>
+      </p:graphicFrame>
+      <p:cxnSp>
+        <p:nvCxnSpPr>
+          <p:cNvPr id="4" name="直接箭头连接符 3"/>
+          <p:cNvCxnSpPr>
+            <a:stCxn id="13" idx="3"/>
+            <a:endCxn id="14" idx="1"/>
+          </p:cNvCxnSpPr>
+          <p:nvPr/>
+        </p:nvCxnSpPr>
+        <p:spPr>
+          <a:xfrm flipV="1">
+            <a:off x="5905500" y="2362583"/>
+            <a:ext cx="4205151" cy="1581331"/>
+          </a:xfrm>
+          <a:prstGeom prst="straightConnector1">
+            <a:avLst/>
+          </a:prstGeom>
+          <a:ln>
+            <a:tailEnd type="triangle"/>
+          </a:ln>
+        </p:spPr>
+        <p:style>
+          <a:lnRef idx="2">
+            <a:schemeClr val="accent3"/>
+          </a:lnRef>
+          <a:fillRef idx="0">
+            <a:schemeClr val="accent3"/>
+          </a:fillRef>
+          <a:effectRef idx="1">
+            <a:schemeClr val="accent3"/>
+          </a:effectRef>
+          <a:fontRef idx="minor">
+            <a:schemeClr val="tx1"/>
+          </a:fontRef>
+        </p:style>
+      </p:cxnSp>
+      <p:cxnSp>
+        <p:nvCxnSpPr>
+          <p:cNvPr id="20" name="直接箭头连接符 19"/>
+          <p:cNvCxnSpPr>
+            <a:stCxn id="13" idx="3"/>
+            <a:endCxn id="29" idx="1"/>
+          </p:cNvCxnSpPr>
+          <p:nvPr/>
+        </p:nvCxnSpPr>
+        <p:spPr>
+          <a:xfrm>
+            <a:off x="5905500" y="3943914"/>
+            <a:ext cx="4205151" cy="1320361"/>
+          </a:xfrm>
+          <a:prstGeom prst="straightConnector1">
+            <a:avLst/>
+          </a:prstGeom>
+          <a:ln>
+            <a:tailEnd type="triangle"/>
+          </a:ln>
+        </p:spPr>
+        <p:style>
+          <a:lnRef idx="2">
+            <a:schemeClr val="accent3"/>
+          </a:lnRef>
+          <a:fillRef idx="0">
+            <a:schemeClr val="accent3"/>
+          </a:fillRef>
+          <a:effectRef idx="1">
+            <a:schemeClr val="accent3"/>
+          </a:effectRef>
+          <a:fontRef idx="minor">
+            <a:schemeClr val="tx1"/>
+          </a:fontRef>
+        </p:style>
+      </p:cxnSp>
+      <p:sp>
+        <p:nvSpPr>
+          <p:cNvPr id="23" name="文本框 22"/>
+          <p:cNvSpPr txBox="1"/>
+          <p:nvPr/>
+        </p:nvSpPr>
+        <p:spPr>
+          <a:xfrm>
+            <a:off x="6243087" y="2689350"/>
+            <a:ext cx="3087704" cy="954107"/>
+          </a:xfrm>
+          <a:prstGeom prst="rect">
+            <a:avLst/>
+          </a:prstGeom>
+          <a:noFill/>
+        </p:spPr>
+        <p:txBody>
+          <a:bodyPr wrap="none" rtlCol="0">
+            <a:spAutoFit/>
+          </a:bodyPr>
+          <a:lstStyle/>
+          <a:p>
+            <a:pPr algn="ctr"/>
+            <a:r>
+              <a:rPr lang="en-US" altLang="zh-CN" sz="1400" dirty="0" smtClean="0">
+                <a:latin typeface="微软雅黑" panose="020B0503020204020204" pitchFamily="34" charset="-122"/>
+                <a:ea typeface="微软雅黑" panose="020B0503020204020204" pitchFamily="34" charset="-122"/>
+              </a:rPr>
+              <a:t>statement</a:t>
+            </a:r>
+            <a:r>
+              <a:rPr lang="zh-CN" altLang="en-US" sz="1400" dirty="0" smtClean="0">
+                <a:latin typeface="微软雅黑" panose="020B0503020204020204" pitchFamily="34" charset="-122"/>
+                <a:ea typeface="微软雅黑" panose="020B0503020204020204" pitchFamily="34" charset="-122"/>
+              </a:rPr>
+              <a:t>格式的</a:t>
+            </a:r>
+            <a:r>
+              <a:rPr lang="en-US" altLang="zh-CN" sz="1400" dirty="0" err="1" smtClean="0">
+                <a:latin typeface="微软雅黑" panose="020B0503020204020204" pitchFamily="34" charset="-122"/>
+                <a:ea typeface="微软雅黑" panose="020B0503020204020204" pitchFamily="34" charset="-122"/>
+              </a:rPr>
+              <a:t>binlog</a:t>
+            </a:r>
+            <a:r>
+              <a:rPr lang="en-US" altLang="zh-CN" sz="1400" dirty="0" smtClean="0">
+                <a:latin typeface="微软雅黑" panose="020B0503020204020204" pitchFamily="34" charset="-122"/>
+                <a:ea typeface="微软雅黑" panose="020B0503020204020204" pitchFamily="34" charset="-122"/>
+              </a:rPr>
+              <a:t>:</a:t>
+            </a:r>
+          </a:p>
+          <a:p>
+            <a:pPr algn="ctr"/>
+            <a:r>
+              <a:rPr lang="en-US" altLang="zh-CN" sz="1400" dirty="0" smtClean="0">
+                <a:latin typeface="微软雅黑" panose="020B0503020204020204" pitchFamily="34" charset="-122"/>
+                <a:ea typeface="微软雅黑" panose="020B0503020204020204" pitchFamily="34" charset="-122"/>
+              </a:rPr>
+              <a:t>insert into t2 values (null, 5,5);</a:t>
+            </a:r>
+          </a:p>
+          <a:p>
+            <a:pPr algn="ctr"/>
+            <a:r>
+              <a:rPr lang="en-US" altLang="zh-CN" sz="1400" dirty="0" smtClean="0">
+                <a:latin typeface="微软雅黑" panose="020B0503020204020204" pitchFamily="34" charset="-122"/>
+                <a:ea typeface="微软雅黑" panose="020B0503020204020204" pitchFamily="34" charset="-122"/>
+              </a:rPr>
+              <a:t>insert into t2(</a:t>
+            </a:r>
+            <a:r>
+              <a:rPr lang="en-US" altLang="zh-CN" sz="1400" dirty="0" err="1" smtClean="0">
+                <a:latin typeface="微软雅黑" panose="020B0503020204020204" pitchFamily="34" charset="-122"/>
+                <a:ea typeface="微软雅黑" panose="020B0503020204020204" pitchFamily="34" charset="-122"/>
+              </a:rPr>
+              <a:t>c,d</a:t>
+            </a:r>
+            <a:r>
+              <a:rPr lang="en-US" altLang="zh-CN" sz="1400" dirty="0" smtClean="0">
+                <a:latin typeface="微软雅黑" panose="020B0503020204020204" pitchFamily="34" charset="-122"/>
+                <a:ea typeface="微软雅黑" panose="020B0503020204020204" pitchFamily="34" charset="-122"/>
+              </a:rPr>
+              <a:t>) select </a:t>
+            </a:r>
+            <a:r>
+              <a:rPr lang="en-US" altLang="zh-CN" sz="1400" dirty="0" err="1" smtClean="0">
+                <a:latin typeface="微软雅黑" panose="020B0503020204020204" pitchFamily="34" charset="-122"/>
+                <a:ea typeface="微软雅黑" panose="020B0503020204020204" pitchFamily="34" charset="-122"/>
+              </a:rPr>
+              <a:t>c,d</a:t>
+            </a:r>
+            <a:r>
+              <a:rPr lang="en-US" altLang="zh-CN" sz="1400" dirty="0" smtClean="0">
+                <a:latin typeface="微软雅黑" panose="020B0503020204020204" pitchFamily="34" charset="-122"/>
+                <a:ea typeface="微软雅黑" panose="020B0503020204020204" pitchFamily="34" charset="-122"/>
+              </a:rPr>
+              <a:t> from t</a:t>
+            </a:r>
+          </a:p>
+          <a:p>
+            <a:pPr algn="ctr"/>
+            <a:endParaRPr lang="en-US" altLang="zh-CN" sz="1400" dirty="0">
+              <a:latin typeface="微软雅黑" panose="020B0503020204020204" pitchFamily="34" charset="-122"/>
+              <a:ea typeface="微软雅黑" panose="020B0503020204020204" pitchFamily="34" charset="-122"/>
+            </a:endParaRPr>
+          </a:p>
+        </p:txBody>
+      </p:sp>
+      <p:sp>
+        <p:nvSpPr>
+          <p:cNvPr id="27" name="文本框 26"/>
+          <p:cNvSpPr txBox="1"/>
+          <p:nvPr/>
+        </p:nvSpPr>
+        <p:spPr>
+          <a:xfrm>
+            <a:off x="6042479" y="4659716"/>
+            <a:ext cx="3130985" cy="954107"/>
+          </a:xfrm>
+          <a:prstGeom prst="rect">
+            <a:avLst/>
+          </a:prstGeom>
+          <a:noFill/>
+        </p:spPr>
+        <p:txBody>
+          <a:bodyPr wrap="none" rtlCol="0">
+            <a:spAutoFit/>
+          </a:bodyPr>
+          <a:lstStyle/>
+          <a:p>
+            <a:pPr algn="ctr"/>
+            <a:r>
+              <a:rPr lang="en-US" altLang="zh-CN" sz="1400" dirty="0">
+                <a:latin typeface="微软雅黑" panose="020B0503020204020204" pitchFamily="34" charset="-122"/>
+                <a:ea typeface="微软雅黑" panose="020B0503020204020204" pitchFamily="34" charset="-122"/>
+              </a:rPr>
+              <a:t>statement</a:t>
+            </a:r>
+            <a:r>
+              <a:rPr lang="zh-CN" altLang="en-US" sz="1400" dirty="0">
+                <a:latin typeface="微软雅黑" panose="020B0503020204020204" pitchFamily="34" charset="-122"/>
+                <a:ea typeface="微软雅黑" panose="020B0503020204020204" pitchFamily="34" charset="-122"/>
+              </a:rPr>
+              <a:t>格式的</a:t>
+            </a:r>
+            <a:r>
+              <a:rPr lang="en-US" altLang="zh-CN" sz="1400" dirty="0" err="1">
+                <a:latin typeface="微软雅黑" panose="020B0503020204020204" pitchFamily="34" charset="-122"/>
+                <a:ea typeface="微软雅黑" panose="020B0503020204020204" pitchFamily="34" charset="-122"/>
+              </a:rPr>
+              <a:t>binlog</a:t>
+            </a:r>
+            <a:r>
+              <a:rPr lang="en-US" altLang="zh-CN" sz="1400" dirty="0">
+                <a:latin typeface="微软雅黑" panose="020B0503020204020204" pitchFamily="34" charset="-122"/>
+                <a:ea typeface="微软雅黑" panose="020B0503020204020204" pitchFamily="34" charset="-122"/>
+              </a:rPr>
+              <a:t>:</a:t>
+            </a:r>
+          </a:p>
+          <a:p>
+            <a:pPr algn="ctr"/>
+            <a:r>
+              <a:rPr lang="en-US" altLang="zh-CN" sz="1400" dirty="0" smtClean="0">
+                <a:latin typeface="微软雅黑" panose="020B0503020204020204" pitchFamily="34" charset="-122"/>
+                <a:ea typeface="微软雅黑" panose="020B0503020204020204" pitchFamily="34" charset="-122"/>
+              </a:rPr>
+              <a:t>insert into t2(</a:t>
+            </a:r>
+            <a:r>
+              <a:rPr lang="en-US" altLang="zh-CN" sz="1400" dirty="0" err="1" smtClean="0">
+                <a:latin typeface="微软雅黑" panose="020B0503020204020204" pitchFamily="34" charset="-122"/>
+                <a:ea typeface="微软雅黑" panose="020B0503020204020204" pitchFamily="34" charset="-122"/>
+              </a:rPr>
+              <a:t>c,d</a:t>
+            </a:r>
+            <a:r>
+              <a:rPr lang="en-US" altLang="zh-CN" sz="1400" dirty="0" smtClean="0">
+                <a:latin typeface="微软雅黑" panose="020B0503020204020204" pitchFamily="34" charset="-122"/>
+                <a:ea typeface="微软雅黑" panose="020B0503020204020204" pitchFamily="34" charset="-122"/>
+              </a:rPr>
+              <a:t>) select </a:t>
+            </a:r>
+            <a:r>
+              <a:rPr lang="en-US" altLang="zh-CN" sz="1400" dirty="0" err="1" smtClean="0">
+                <a:latin typeface="微软雅黑" panose="020B0503020204020204" pitchFamily="34" charset="-122"/>
+                <a:ea typeface="微软雅黑" panose="020B0503020204020204" pitchFamily="34" charset="-122"/>
+              </a:rPr>
+              <a:t>c,d</a:t>
+            </a:r>
+            <a:r>
+              <a:rPr lang="en-US" altLang="zh-CN" sz="1400" dirty="0" smtClean="0">
+                <a:latin typeface="微软雅黑" panose="020B0503020204020204" pitchFamily="34" charset="-122"/>
+                <a:ea typeface="微软雅黑" panose="020B0503020204020204" pitchFamily="34" charset="-122"/>
+              </a:rPr>
+              <a:t> from t;</a:t>
+            </a:r>
+          </a:p>
+          <a:p>
+            <a:pPr algn="ctr"/>
+            <a:r>
+              <a:rPr lang="en-US" altLang="zh-CN" sz="1400" dirty="0">
+                <a:latin typeface="微软雅黑" panose="020B0503020204020204" pitchFamily="34" charset="-122"/>
+                <a:ea typeface="微软雅黑" panose="020B0503020204020204" pitchFamily="34" charset="-122"/>
+              </a:rPr>
+              <a:t>insert into t2 values (null, 5,5</a:t>
+            </a:r>
+            <a:r>
+              <a:rPr lang="en-US" altLang="zh-CN" sz="1400" dirty="0" smtClean="0">
+                <a:latin typeface="微软雅黑" panose="020B0503020204020204" pitchFamily="34" charset="-122"/>
+                <a:ea typeface="微软雅黑" panose="020B0503020204020204" pitchFamily="34" charset="-122"/>
+              </a:rPr>
+              <a:t>);</a:t>
+            </a:r>
+          </a:p>
+          <a:p>
+            <a:pPr algn="ctr"/>
+            <a:endParaRPr lang="en-US" altLang="zh-CN" sz="1400" dirty="0">
+              <a:latin typeface="微软雅黑" panose="020B0503020204020204" pitchFamily="34" charset="-122"/>
+              <a:ea typeface="微软雅黑" panose="020B0503020204020204" pitchFamily="34" charset="-122"/>
+            </a:endParaRPr>
+          </a:p>
+        </p:txBody>
+      </p:sp>
+      <p:graphicFrame>
+        <p:nvGraphicFramePr>
+          <p:cNvPr id="29" name="表格 28"/>
+          <p:cNvGraphicFramePr>
+            <a:graphicFrameLocks noGrp="1"/>
+          </p:cNvGraphicFramePr>
+          <p:nvPr>
+            <p:extLst>
+              <p:ext uri="{D42A27DB-BD31-4B8C-83A1-F6EECF244321}">
+                <p14:modId xmlns:p14="http://schemas.microsoft.com/office/powerpoint/2010/main" val="2251984236"/>
+              </p:ext>
+            </p:extLst>
+          </p:nvPr>
+        </p:nvGraphicFramePr>
+        <p:xfrm>
+          <a:off x="10110651" y="4283593"/>
+          <a:ext cx="1942487" cy="1961364"/>
+        </p:xfrm>
+        <a:graphic>
+          <a:graphicData uri="http://schemas.openxmlformats.org/drawingml/2006/table">
+            <a:tbl>
+              <a:tblPr firstRow="1" bandRow="1">
+                <a:tableStyleId>{5C22544A-7EE6-4342-B048-85BDC9FD1C3A}</a:tableStyleId>
+              </a:tblPr>
+              <a:tblGrid>
+                <a:gridCol w="1942487">
+                  <a:extLst>
+                    <a:ext uri="{9D8B030D-6E8A-4147-A177-3AD203B41FA5}">
+                      <a16:colId xmlns:a16="http://schemas.microsoft.com/office/drawing/2014/main" val="3946032188"/>
+                    </a:ext>
+                  </a:extLst>
+                </a:gridCol>
+              </a:tblGrid>
+              <a:tr h="326894">
+                <a:tc>
+                  <a:txBody>
+                    <a:bodyPr/>
+                    <a:lstStyle/>
+                    <a:p>
+                      <a:r>
+                        <a:rPr lang="zh-CN" altLang="en-US" sz="1200" dirty="0" smtClean="0">
+                          <a:solidFill>
+                            <a:schemeClr val="tx1"/>
+                          </a:solidFill>
+                          <a:latin typeface="微软雅黑" panose="020B0503020204020204" pitchFamily="34" charset="-122"/>
+                          <a:ea typeface="微软雅黑" panose="020B0503020204020204" pitchFamily="34" charset="-122"/>
+                        </a:rPr>
+                        <a:t>备库执行</a:t>
+                      </a:r>
+                      <a:endParaRPr lang="zh-CN" altLang="en-US" sz="1200" dirty="0">
+                        <a:solidFill>
+                          <a:schemeClr val="tx1"/>
+                        </a:solidFill>
+                        <a:latin typeface="微软雅黑" panose="020B0503020204020204" pitchFamily="34" charset="-122"/>
+                        <a:ea typeface="微软雅黑" panose="020B0503020204020204" pitchFamily="34" charset="-122"/>
+                      </a:endParaRPr>
+                    </a:p>
+                  </a:txBody>
+                  <a:tcPr/>
+                </a:tc>
+                <a:extLst>
+                  <a:ext uri="{0D108BD9-81ED-4DB2-BD59-A6C34878D82A}">
+                    <a16:rowId xmlns:a16="http://schemas.microsoft.com/office/drawing/2014/main" val="1827706926"/>
+                  </a:ext>
+                </a:extLst>
+              </a:tr>
+              <a:tr h="326894">
+                <a:tc>
+                  <a:txBody>
+                    <a:bodyPr/>
+                    <a:lstStyle/>
+                    <a:p>
+                      <a:r>
+                        <a:rPr lang="en-US" altLang="zh-CN" sz="1200" baseline="0" dirty="0" smtClean="0">
+                          <a:solidFill>
+                            <a:schemeClr val="bg1"/>
+                          </a:solidFill>
+                          <a:latin typeface="微软雅黑" panose="020B0503020204020204" pitchFamily="34" charset="-122"/>
+                          <a:ea typeface="微软雅黑" panose="020B0503020204020204" pitchFamily="34" charset="-122"/>
+                        </a:rPr>
+                        <a:t>insert(1,1,1)</a:t>
+                      </a:r>
+                    </a:p>
+                  </a:txBody>
+                  <a:tcPr/>
+                </a:tc>
+                <a:extLst>
+                  <a:ext uri="{0D108BD9-81ED-4DB2-BD59-A6C34878D82A}">
+                    <a16:rowId xmlns:a16="http://schemas.microsoft.com/office/drawing/2014/main" val="3274968019"/>
+                  </a:ext>
+                </a:extLst>
+              </a:tr>
+              <a:tr h="326894">
+                <a:tc>
+                  <a:txBody>
+                    <a:bodyPr/>
+                    <a:lstStyle/>
+                    <a:p>
+                      <a:r>
+                        <a:rPr lang="en-US" altLang="zh-CN" sz="1200" dirty="0" smtClean="0">
+                          <a:solidFill>
+                            <a:schemeClr val="bg1"/>
+                          </a:solidFill>
+                          <a:latin typeface="微软雅黑" panose="020B0503020204020204" pitchFamily="34" charset="-122"/>
+                          <a:ea typeface="微软雅黑" panose="020B0503020204020204" pitchFamily="34" charset="-122"/>
+                        </a:rPr>
+                        <a:t>insert(2,2,2)</a:t>
+                      </a:r>
+                    </a:p>
+                  </a:txBody>
+                  <a:tcPr/>
+                </a:tc>
+                <a:extLst>
+                  <a:ext uri="{0D108BD9-81ED-4DB2-BD59-A6C34878D82A}">
+                    <a16:rowId xmlns:a16="http://schemas.microsoft.com/office/drawing/2014/main" val="4026781452"/>
+                  </a:ext>
+                </a:extLst>
+              </a:tr>
+              <a:tr h="326894">
+                <a:tc>
+                  <a:txBody>
+                    <a:bodyPr/>
+                    <a:lstStyle/>
+                    <a:p>
+                      <a:r>
+                        <a:rPr lang="en-US" altLang="zh-CN" sz="1200" baseline="0" dirty="0" smtClean="0">
+                          <a:solidFill>
+                            <a:schemeClr val="bg1"/>
+                          </a:solidFill>
+                          <a:latin typeface="微软雅黑" panose="020B0503020204020204" pitchFamily="34" charset="-122"/>
+                          <a:ea typeface="微软雅黑" panose="020B0503020204020204" pitchFamily="34" charset="-122"/>
+                        </a:rPr>
+                        <a:t>insert(3,3,3)</a:t>
+                      </a:r>
+                    </a:p>
+                  </a:txBody>
+                  <a:tcPr/>
+                </a:tc>
+                <a:extLst>
+                  <a:ext uri="{0D108BD9-81ED-4DB2-BD59-A6C34878D82A}">
+                    <a16:rowId xmlns:a16="http://schemas.microsoft.com/office/drawing/2014/main" val="3767319794"/>
+                  </a:ext>
+                </a:extLst>
+              </a:tr>
+              <a:tr h="326894">
+                <a:tc>
+                  <a:txBody>
+                    <a:bodyPr/>
+                    <a:lstStyle/>
+                    <a:p>
+                      <a:r>
+                        <a:rPr lang="en-US" altLang="zh-CN" sz="1200" baseline="0" dirty="0" smtClean="0">
+                          <a:solidFill>
+                            <a:schemeClr val="bg1"/>
+                          </a:solidFill>
+                          <a:latin typeface="微软雅黑" panose="020B0503020204020204" pitchFamily="34" charset="-122"/>
+                          <a:ea typeface="微软雅黑" panose="020B0503020204020204" pitchFamily="34" charset="-122"/>
+                        </a:rPr>
+                        <a:t>insert(4,4,4)</a:t>
+                      </a:r>
+                    </a:p>
+                  </a:txBody>
+                  <a:tcPr/>
+                </a:tc>
+                <a:extLst>
+                  <a:ext uri="{0D108BD9-81ED-4DB2-BD59-A6C34878D82A}">
+                    <a16:rowId xmlns:a16="http://schemas.microsoft.com/office/drawing/2014/main" val="3436968484"/>
+                  </a:ext>
+                </a:extLst>
+              </a:tr>
+              <a:tr h="326894">
+                <a:tc>
+                  <a:txBody>
+                    <a:bodyPr/>
+                    <a:lstStyle/>
+                    <a:p>
+                      <a:r>
+                        <a:rPr lang="en-US" altLang="zh-CN" sz="1200" baseline="0" dirty="0" smtClean="0">
+                          <a:solidFill>
+                            <a:schemeClr val="bg1"/>
+                          </a:solidFill>
+                          <a:latin typeface="微软雅黑" panose="020B0503020204020204" pitchFamily="34" charset="-122"/>
+                          <a:ea typeface="微软雅黑" panose="020B0503020204020204" pitchFamily="34" charset="-122"/>
+                        </a:rPr>
+                        <a:t>insert(5,5,5)</a:t>
+                      </a:r>
+                    </a:p>
+                  </a:txBody>
+                  <a:tcPr/>
+                </a:tc>
+                <a:extLst>
+                  <a:ext uri="{0D108BD9-81ED-4DB2-BD59-A6C34878D82A}">
+                    <a16:rowId xmlns:a16="http://schemas.microsoft.com/office/drawing/2014/main" val="1156885343"/>
+                  </a:ext>
+                </a:extLst>
+              </a:tr>
+            </a:tbl>
+          </a:graphicData>
+        </a:graphic>
+      </p:graphicFrame>
+      <p:sp>
+        <p:nvSpPr>
+          <p:cNvPr id="31" name="矩形标注 30"/>
+          <p:cNvSpPr/>
+          <p:nvPr/>
+        </p:nvSpPr>
+        <p:spPr>
+          <a:xfrm>
+            <a:off x="6306221" y="5811318"/>
+            <a:ext cx="2603499" cy="579488"/>
+          </a:xfrm>
+          <a:prstGeom prst="wedgeRectCallout">
+            <a:avLst>
+              <a:gd name="adj1" fmla="val 28165"/>
+              <a:gd name="adj2" fmla="val -123727"/>
+            </a:avLst>
+          </a:prstGeom>
+          <a:solidFill>
+            <a:schemeClr val="tx1">
+              <a:lumMod val="85000"/>
+              <a:alpha val="50000"/>
+            </a:schemeClr>
+          </a:solidFill>
+          <a:ln>
+            <a:noFill/>
+          </a:ln>
+        </p:spPr>
+        <p:style>
+          <a:lnRef idx="0">
+            <a:scrgbClr r="0" g="0" b="0"/>
+          </a:lnRef>
+          <a:fillRef idx="0">
+            <a:scrgbClr r="0" g="0" b="0"/>
+          </a:fillRef>
+          <a:effectRef idx="0">
+            <a:scrgbClr r="0" g="0" b="0"/>
+          </a:effectRef>
+          <a:fontRef idx="minor">
+            <a:schemeClr val="lt1"/>
+          </a:fontRef>
+        </p:style>
+        <p:txBody>
+          <a:bodyPr rtlCol="0" anchor="ctr"/>
+          <a:lstStyle/>
+          <a:p>
+            <a:r>
+              <a:rPr lang="zh-CN" altLang="en-US" sz="1200" dirty="0" smtClean="0">
+                <a:latin typeface="微软雅黑" panose="020B0503020204020204" pitchFamily="34" charset="-122"/>
+                <a:ea typeface="微软雅黑" panose="020B0503020204020204" pitchFamily="34" charset="-122"/>
+              </a:rPr>
+              <a:t>无论</a:t>
+            </a:r>
+            <a:r>
+              <a:rPr lang="en-US" altLang="zh-CN" sz="1200" dirty="0" smtClean="0">
+                <a:latin typeface="微软雅黑" panose="020B0503020204020204" pitchFamily="34" charset="-122"/>
+                <a:ea typeface="微软雅黑" panose="020B0503020204020204" pitchFamily="34" charset="-122"/>
+              </a:rPr>
+              <a:t>statement</a:t>
+            </a:r>
+            <a:r>
+              <a:rPr lang="zh-CN" altLang="en-US" sz="1200" dirty="0" smtClean="0">
+                <a:latin typeface="微软雅黑" panose="020B0503020204020204" pitchFamily="34" charset="-122"/>
+                <a:ea typeface="微软雅黑" panose="020B0503020204020204" pitchFamily="34" charset="-122"/>
+              </a:rPr>
+              <a:t>格式的</a:t>
+            </a:r>
+            <a:r>
+              <a:rPr lang="en-US" altLang="zh-CN" sz="1200" dirty="0" err="1" smtClean="0">
+                <a:latin typeface="微软雅黑" panose="020B0503020204020204" pitchFamily="34" charset="-122"/>
+                <a:ea typeface="微软雅黑" panose="020B0503020204020204" pitchFamily="34" charset="-122"/>
+              </a:rPr>
+              <a:t>binlog</a:t>
+            </a:r>
+            <a:r>
+              <a:rPr lang="zh-CN" altLang="en-US" sz="1200" dirty="0" smtClean="0">
+                <a:latin typeface="微软雅黑" panose="020B0503020204020204" pitchFamily="34" charset="-122"/>
+                <a:ea typeface="微软雅黑" panose="020B0503020204020204" pitchFamily="34" charset="-122"/>
+              </a:rPr>
+              <a:t>怎么记，备库上都不可能执行出主库的数据。</a:t>
+            </a:r>
+            <a:endParaRPr lang="en-US" altLang="zh-CN" sz="1200" dirty="0" smtClean="0">
+              <a:latin typeface="微软雅黑" panose="020B0503020204020204" pitchFamily="34" charset="-122"/>
+              <a:ea typeface="微软雅黑" panose="020B0503020204020204" pitchFamily="34" charset="-122"/>
+            </a:endParaRPr>
+          </a:p>
+        </p:txBody>
+      </p:sp>
+      <p:sp>
+        <p:nvSpPr>
+          <p:cNvPr id="32" name="矩形标注 31"/>
+          <p:cNvSpPr/>
+          <p:nvPr/>
+        </p:nvSpPr>
+        <p:spPr>
+          <a:xfrm>
+            <a:off x="284754" y="5034335"/>
+            <a:ext cx="4059161" cy="579488"/>
+          </a:xfrm>
+          <a:prstGeom prst="wedgeRectCallout">
+            <a:avLst>
+              <a:gd name="adj1" fmla="val 26888"/>
+              <a:gd name="adj2" fmla="val -94422"/>
+            </a:avLst>
+          </a:prstGeom>
+          <a:solidFill>
+            <a:schemeClr val="tx1">
+              <a:lumMod val="85000"/>
+              <a:alpha val="50000"/>
+            </a:schemeClr>
+          </a:solidFill>
+          <a:ln>
+            <a:noFill/>
+          </a:ln>
+        </p:spPr>
+        <p:style>
+          <a:lnRef idx="0">
+            <a:scrgbClr r="0" g="0" b="0"/>
+          </a:lnRef>
+          <a:fillRef idx="0">
+            <a:scrgbClr r="0" g="0" b="0"/>
+          </a:fillRef>
+          <a:effectRef idx="0">
+            <a:scrgbClr r="0" g="0" b="0"/>
+          </a:effectRef>
+          <a:fontRef idx="minor">
+            <a:schemeClr val="lt1"/>
+          </a:fontRef>
+        </p:style>
+        <p:txBody>
+          <a:bodyPr rtlCol="0" anchor="ctr"/>
+          <a:lstStyle/>
+          <a:p>
+            <a:r>
+              <a:rPr lang="zh-CN" altLang="en-US" sz="1200" dirty="0" smtClean="0">
+                <a:latin typeface="微软雅黑" panose="020B0503020204020204" pitchFamily="34" charset="-122"/>
+                <a:ea typeface="微软雅黑" panose="020B0503020204020204" pitchFamily="34" charset="-122"/>
+              </a:rPr>
+              <a:t>一种可能的执行顺序，</a:t>
+            </a:r>
+            <a:r>
+              <a:rPr lang="en-US" altLang="zh-CN" sz="1200" dirty="0" err="1" smtClean="0">
+                <a:latin typeface="微软雅黑" panose="020B0503020204020204" pitchFamily="34" charset="-122"/>
+                <a:ea typeface="微软雅黑" panose="020B0503020204020204" pitchFamily="34" charset="-122"/>
+              </a:rPr>
+              <a:t>sessionA</a:t>
+            </a:r>
+            <a:r>
+              <a:rPr lang="zh-CN" altLang="en-US" sz="1200" dirty="0" smtClean="0">
+                <a:latin typeface="微软雅黑" panose="020B0503020204020204" pitchFamily="34" charset="-122"/>
+                <a:ea typeface="微软雅黑" panose="020B0503020204020204" pitchFamily="34" charset="-122"/>
+              </a:rPr>
+              <a:t>和</a:t>
+            </a:r>
+            <a:r>
+              <a:rPr lang="en-US" altLang="zh-CN" sz="1200" dirty="0" err="1" smtClean="0">
+                <a:latin typeface="微软雅黑" panose="020B0503020204020204" pitchFamily="34" charset="-122"/>
+                <a:ea typeface="微软雅黑" panose="020B0503020204020204" pitchFamily="34" charset="-122"/>
+              </a:rPr>
+              <a:t>sessionB</a:t>
+            </a:r>
+            <a:r>
+              <a:rPr lang="zh-CN" altLang="en-US" sz="1200" dirty="0" smtClean="0">
+                <a:latin typeface="微软雅黑" panose="020B0503020204020204" pitchFamily="34" charset="-122"/>
+                <a:ea typeface="微软雅黑" panose="020B0503020204020204" pitchFamily="34" charset="-122"/>
+              </a:rPr>
+              <a:t>交叉执行。</a:t>
+            </a:r>
+            <a:endParaRPr lang="en-US" altLang="zh-CN" sz="1200" dirty="0" smtClean="0">
+              <a:latin typeface="微软雅黑" panose="020B0503020204020204" pitchFamily="34" charset="-122"/>
+              <a:ea typeface="微软雅黑" panose="020B0503020204020204" pitchFamily="34" charset="-122"/>
+            </a:endParaRPr>
+          </a:p>
+        </p:txBody>
+      </p:sp>
+      <p:sp>
+        <p:nvSpPr>
+          <p:cNvPr id="15" name="矩形 14"/>
+          <p:cNvSpPr/>
+          <p:nvPr/>
+        </p:nvSpPr>
+        <p:spPr>
+          <a:xfrm>
+            <a:off x="284753" y="5793285"/>
+            <a:ext cx="6298927" cy="954107"/>
+          </a:xfrm>
+          <a:prstGeom prst="rect">
+            <a:avLst/>
+          </a:prstGeom>
+        </p:spPr>
+        <p:txBody>
+          <a:bodyPr wrap="square">
+            <a:spAutoFit/>
+          </a:bodyPr>
+          <a:lstStyle/>
+          <a:p>
+            <a:r>
+              <a:rPr lang="zh-CN" altLang="en-US" sz="1400" dirty="0">
+                <a:solidFill>
+                  <a:srgbClr val="FFFF00"/>
+                </a:solidFill>
+                <a:latin typeface="微软雅黑" panose="020B0503020204020204" pitchFamily="34" charset="-122"/>
+                <a:ea typeface="微软雅黑" panose="020B0503020204020204" pitchFamily="34" charset="-122"/>
+              </a:rPr>
+              <a:t>解决</a:t>
+            </a:r>
+            <a:r>
+              <a:rPr lang="zh-CN" altLang="en-US" sz="1400" dirty="0" smtClean="0">
+                <a:solidFill>
+                  <a:srgbClr val="FFFF00"/>
+                </a:solidFill>
+                <a:latin typeface="微软雅黑" panose="020B0503020204020204" pitchFamily="34" charset="-122"/>
+                <a:ea typeface="微软雅黑" panose="020B0503020204020204" pitchFamily="34" charset="-122"/>
+              </a:rPr>
+              <a:t>思路：</a:t>
+            </a:r>
+            <a:endParaRPr lang="en-US" altLang="zh-CN" sz="1400" dirty="0" smtClean="0">
+              <a:solidFill>
+                <a:srgbClr val="FFFF00"/>
+              </a:solidFill>
+              <a:latin typeface="微软雅黑" panose="020B0503020204020204" pitchFamily="34" charset="-122"/>
+              <a:ea typeface="微软雅黑" panose="020B0503020204020204" pitchFamily="34" charset="-122"/>
+            </a:endParaRPr>
+          </a:p>
+          <a:p>
+            <a:r>
+              <a:rPr lang="en-US" altLang="zh-CN" sz="1400" dirty="0" smtClean="0">
+                <a:solidFill>
+                  <a:srgbClr val="FFFF00"/>
+                </a:solidFill>
+                <a:latin typeface="微软雅黑" panose="020B0503020204020204" pitchFamily="34" charset="-122"/>
+                <a:ea typeface="微软雅黑" panose="020B0503020204020204" pitchFamily="34" charset="-122"/>
+              </a:rPr>
+              <a:t>1</a:t>
+            </a:r>
+            <a:r>
+              <a:rPr lang="zh-CN" altLang="en-US" sz="1400" dirty="0" smtClean="0">
+                <a:solidFill>
+                  <a:srgbClr val="FFFF00"/>
+                </a:solidFill>
+                <a:latin typeface="微软雅黑" panose="020B0503020204020204" pitchFamily="34" charset="-122"/>
+                <a:ea typeface="微软雅黑" panose="020B0503020204020204" pitchFamily="34" charset="-122"/>
+              </a:rPr>
+              <a:t>，主库批量插入数据语句，固定生成连续的</a:t>
+            </a:r>
+            <a:r>
+              <a:rPr lang="en-US" altLang="zh-CN" sz="1400" dirty="0" smtClean="0">
+                <a:solidFill>
+                  <a:srgbClr val="FFFF00"/>
+                </a:solidFill>
+                <a:latin typeface="微软雅黑" panose="020B0503020204020204" pitchFamily="34" charset="-122"/>
+                <a:ea typeface="微软雅黑" panose="020B0503020204020204" pitchFamily="34" charset="-122"/>
+              </a:rPr>
+              <a:t>id</a:t>
+            </a:r>
+            <a:r>
+              <a:rPr lang="zh-CN" altLang="en-US" sz="1400" dirty="0" smtClean="0">
+                <a:solidFill>
+                  <a:srgbClr val="FFFF00"/>
+                </a:solidFill>
+                <a:latin typeface="微软雅黑" panose="020B0503020204020204" pitchFamily="34" charset="-122"/>
+                <a:ea typeface="微软雅黑" panose="020B0503020204020204" pitchFamily="34" charset="-122"/>
+              </a:rPr>
+              <a:t>值。即</a:t>
+            </a:r>
+            <a:r>
+              <a:rPr lang="en-US" altLang="zh-CN" sz="1400" dirty="0" err="1" smtClean="0">
+                <a:solidFill>
+                  <a:srgbClr val="FFFF00"/>
+                </a:solidFill>
+                <a:latin typeface="微软雅黑" panose="020B0503020204020204" pitchFamily="34" charset="-122"/>
+                <a:ea typeface="微软雅黑" panose="020B0503020204020204" pitchFamily="34" charset="-122"/>
+              </a:rPr>
+              <a:t>innodb_autoinc_lock_mode</a:t>
+            </a:r>
+            <a:r>
+              <a:rPr lang="en-US" altLang="zh-CN" sz="1400" dirty="0" smtClean="0">
+                <a:solidFill>
+                  <a:srgbClr val="FFFF00"/>
+                </a:solidFill>
+                <a:latin typeface="微软雅黑" panose="020B0503020204020204" pitchFamily="34" charset="-122"/>
+                <a:ea typeface="微软雅黑" panose="020B0503020204020204" pitchFamily="34" charset="-122"/>
+              </a:rPr>
+              <a:t>=1</a:t>
+            </a:r>
+            <a:r>
+              <a:rPr lang="zh-CN" altLang="en-US" sz="1400" dirty="0" smtClean="0">
+                <a:solidFill>
+                  <a:srgbClr val="FFFF00"/>
+                </a:solidFill>
+                <a:latin typeface="微软雅黑" panose="020B0503020204020204" pitchFamily="34" charset="-122"/>
+                <a:ea typeface="微软雅黑" panose="020B0503020204020204" pitchFamily="34" charset="-122"/>
+              </a:rPr>
+              <a:t>时第二种情况的处理方法。</a:t>
+            </a:r>
+            <a:endParaRPr lang="en-US" altLang="zh-CN" sz="1400" dirty="0" smtClean="0">
+              <a:solidFill>
+                <a:srgbClr val="FFFF00"/>
+              </a:solidFill>
+              <a:latin typeface="微软雅黑" panose="020B0503020204020204" pitchFamily="34" charset="-122"/>
+              <a:ea typeface="微软雅黑" panose="020B0503020204020204" pitchFamily="34" charset="-122"/>
+            </a:endParaRPr>
+          </a:p>
+          <a:p>
+            <a:r>
+              <a:rPr lang="en-US" altLang="zh-CN" sz="1400" dirty="0" smtClean="0">
+                <a:solidFill>
+                  <a:srgbClr val="FFFF00"/>
+                </a:solidFill>
+                <a:latin typeface="微软雅黑" panose="020B0503020204020204" pitchFamily="34" charset="-122"/>
+                <a:ea typeface="微软雅黑" panose="020B0503020204020204" pitchFamily="34" charset="-122"/>
+              </a:rPr>
+              <a:t>2</a:t>
+            </a:r>
+            <a:r>
+              <a:rPr lang="zh-CN" altLang="en-US" sz="1400" dirty="0" smtClean="0">
+                <a:solidFill>
+                  <a:srgbClr val="FFFF00"/>
+                </a:solidFill>
+                <a:latin typeface="微软雅黑" panose="020B0503020204020204" pitchFamily="34" charset="-122"/>
+                <a:ea typeface="微软雅黑" panose="020B0503020204020204" pitchFamily="34" charset="-122"/>
+              </a:rPr>
+              <a:t>，</a:t>
+            </a:r>
+            <a:r>
+              <a:rPr lang="en-US" altLang="zh-CN" sz="1400" dirty="0" err="1" smtClean="0">
+                <a:solidFill>
+                  <a:srgbClr val="FFFF00"/>
+                </a:solidFill>
+                <a:latin typeface="微软雅黑" panose="020B0503020204020204" pitchFamily="34" charset="-122"/>
+                <a:ea typeface="微软雅黑" panose="020B0503020204020204" pitchFamily="34" charset="-122"/>
+              </a:rPr>
+              <a:t>innodb_autoinc_lock_mode</a:t>
+            </a:r>
+            <a:r>
+              <a:rPr lang="en-US" altLang="zh-CN" sz="1400" dirty="0" smtClean="0">
+                <a:solidFill>
+                  <a:srgbClr val="FFFF00"/>
+                </a:solidFill>
+                <a:latin typeface="微软雅黑" panose="020B0503020204020204" pitchFamily="34" charset="-122"/>
+                <a:ea typeface="微软雅黑" panose="020B0503020204020204" pitchFamily="34" charset="-122"/>
+              </a:rPr>
+              <a:t>=2</a:t>
+            </a:r>
+            <a:r>
+              <a:rPr lang="zh-CN" altLang="en-US" sz="1400" dirty="0" smtClean="0">
+                <a:solidFill>
+                  <a:srgbClr val="FFFF00"/>
+                </a:solidFill>
+                <a:latin typeface="微软雅黑" panose="020B0503020204020204" pitchFamily="34" charset="-122"/>
+                <a:ea typeface="微软雅黑" panose="020B0503020204020204" pitchFamily="34" charset="-122"/>
+              </a:rPr>
+              <a:t>，同时设置</a:t>
+            </a:r>
+            <a:r>
+              <a:rPr lang="en-US" altLang="zh-CN" sz="1400" dirty="0" err="1" smtClean="0">
+                <a:solidFill>
+                  <a:srgbClr val="FFFF00"/>
+                </a:solidFill>
+                <a:latin typeface="微软雅黑" panose="020B0503020204020204" pitchFamily="34" charset="-122"/>
+                <a:ea typeface="微软雅黑" panose="020B0503020204020204" pitchFamily="34" charset="-122"/>
+              </a:rPr>
+              <a:t>binlog_format</a:t>
+            </a:r>
+            <a:r>
+              <a:rPr lang="en-US" altLang="zh-CN" sz="1400" dirty="0" smtClean="0">
+                <a:solidFill>
+                  <a:srgbClr val="FFFF00"/>
+                </a:solidFill>
+                <a:latin typeface="微软雅黑" panose="020B0503020204020204" pitchFamily="34" charset="-122"/>
+                <a:ea typeface="微软雅黑" panose="020B0503020204020204" pitchFamily="34" charset="-122"/>
+              </a:rPr>
+              <a:t>=row</a:t>
+            </a:r>
+            <a:r>
+              <a:rPr lang="zh-CN" altLang="en-US" sz="1400" dirty="0" smtClean="0">
+                <a:solidFill>
+                  <a:srgbClr val="FFFF00"/>
+                </a:solidFill>
+                <a:latin typeface="微软雅黑" panose="020B0503020204020204" pitchFamily="34" charset="-122"/>
+                <a:ea typeface="微软雅黑" panose="020B0503020204020204" pitchFamily="34" charset="-122"/>
+              </a:rPr>
+              <a:t>（最优）</a:t>
+            </a:r>
+            <a:endParaRPr lang="en-US" altLang="zh-CN" sz="1400" dirty="0" smtClean="0">
+              <a:solidFill>
+                <a:srgbClr val="FFFF00"/>
+              </a:solidFill>
+              <a:latin typeface="微软雅黑" panose="020B0503020204020204" pitchFamily="34" charset="-122"/>
+              <a:ea typeface="微软雅黑" panose="020B0503020204020204" pitchFamily="34" charset="-122"/>
+            </a:endParaRPr>
+          </a:p>
+        </p:txBody>
+      </p:sp>
+    </p:spTree>
+    <p:extLst>
+      <p:ext uri="{BB962C8B-B14F-4D97-AF65-F5344CB8AC3E}">
+        <p14:creationId xmlns:p14="http://schemas.microsoft.com/office/powerpoint/2010/main" val="2277726172"/>
       </p:ext>
     </p:extLst>
   </p:cSld>

</xml_diff>